<commit_message>
new and Final Presentation
</commit_message>
<xml_diff>
--- a/docs/3rd Iteration  .pptx
+++ b/docs/3rd Iteration  .pptx
@@ -21,26 +21,23 @@
     <p:sldId id="266" r:id="rId16"/>
     <p:sldId id="267" r:id="rId17"/>
     <p:sldId id="268" r:id="rId18"/>
-    <p:sldId id="269" r:id="rId19"/>
-    <p:sldId id="270" r:id="rId20"/>
-    <p:sldId id="271" r:id="rId21"/>
   </p:sldIdLst>
   <p:sldSz cy="5143500" cx="9144000"/>
   <p:notesSz cx="6858000" cy="9144000"/>
   <p:embeddedFontLst>
     <p:embeddedFont>
       <p:font typeface="Raleway"/>
-      <p:regular r:id="rId22"/>
-      <p:bold r:id="rId23"/>
-      <p:italic r:id="rId24"/>
-      <p:boldItalic r:id="rId25"/>
+      <p:regular r:id="rId19"/>
+      <p:bold r:id="rId20"/>
+      <p:italic r:id="rId21"/>
+      <p:boldItalic r:id="rId22"/>
     </p:embeddedFont>
     <p:embeddedFont>
       <p:font typeface="Lato"/>
-      <p:regular r:id="rId26"/>
-      <p:bold r:id="rId27"/>
-      <p:italic r:id="rId28"/>
-      <p:boldItalic r:id="rId29"/>
+      <p:regular r:id="rId23"/>
+      <p:bold r:id="rId24"/>
+      <p:italic r:id="rId25"/>
+      <p:boldItalic r:id="rId26"/>
     </p:embeddedFont>
   </p:embeddedFontLst>
   <p:defaultTextStyle>
@@ -821,7 +818,7 @@
   <p:cSld>
     <p:spTree>
       <p:nvGrpSpPr>
-        <p:cNvPr id="150" name="Shape 150"/>
+        <p:cNvPr id="152" name="Shape 152"/>
         <p:cNvGrpSpPr/>
         <p:nvPr/>
       </p:nvGrpSpPr>
@@ -835,7 +832,7 @@
       </p:grpSpPr>
       <p:sp>
         <p:nvSpPr>
-          <p:cNvPr id="151" name="Google Shape;151;g125f479ed05_0_113:notes"/>
+          <p:cNvPr id="153" name="Google Shape;153;g125f479ed05_0_113:notes"/>
           <p:cNvSpPr/>
           <p:nvPr>
             <p:ph idx="2" type="sldImg"/>
@@ -870,7 +867,7 @@
       </p:sp>
       <p:sp>
         <p:nvSpPr>
-          <p:cNvPr id="152" name="Google Shape;152;g125f479ed05_0_113:notes"/>
+          <p:cNvPr id="154" name="Google Shape;154;g125f479ed05_0_113:notes"/>
           <p:cNvSpPr txBox="1"/>
           <p:nvPr>
             <p:ph idx="1" type="body"/>
@@ -920,7 +917,7 @@
   <p:cSld>
     <p:spTree>
       <p:nvGrpSpPr>
-        <p:cNvPr id="156" name="Shape 156"/>
+        <p:cNvPr id="158" name="Shape 158"/>
         <p:cNvGrpSpPr/>
         <p:nvPr/>
       </p:nvGrpSpPr>
@@ -934,7 +931,7 @@
       </p:grpSpPr>
       <p:sp>
         <p:nvSpPr>
-          <p:cNvPr id="157" name="Google Shape;157;g611cfcb12990f186_280:notes"/>
+          <p:cNvPr id="159" name="Google Shape;159;g125f479ed05_0_83:notes"/>
           <p:cNvSpPr/>
           <p:nvPr>
             <p:ph idx="2" type="sldImg"/>
@@ -969,7 +966,7 @@
       </p:sp>
       <p:sp>
         <p:nvSpPr>
-          <p:cNvPr id="158" name="Google Shape;158;g611cfcb12990f186_280:notes"/>
+          <p:cNvPr id="160" name="Google Shape;160;g125f479ed05_0_83:notes"/>
           <p:cNvSpPr txBox="1"/>
           <p:nvPr>
             <p:ph idx="1" type="body"/>
@@ -1019,7 +1016,7 @@
   <p:cSld>
     <p:spTree>
       <p:nvGrpSpPr>
-        <p:cNvPr id="165" name="Shape 165"/>
+        <p:cNvPr id="166" name="Shape 166"/>
         <p:cNvGrpSpPr/>
         <p:nvPr/>
       </p:nvGrpSpPr>
@@ -1033,7 +1030,7 @@
       </p:grpSpPr>
       <p:sp>
         <p:nvSpPr>
-          <p:cNvPr id="166" name="Google Shape;166;g611cfcb12990f186_0:notes"/>
+          <p:cNvPr id="167" name="Google Shape;167;g611cfcb12990f186_275:notes"/>
           <p:cNvSpPr/>
           <p:nvPr>
             <p:ph idx="2" type="sldImg"/>
@@ -1068,7 +1065,7 @@
       </p:sp>
       <p:sp>
         <p:nvSpPr>
-          <p:cNvPr id="167" name="Google Shape;167;g611cfcb12990f186_0:notes"/>
+          <p:cNvPr id="168" name="Google Shape;168;g611cfcb12990f186_275:notes"/>
           <p:cNvSpPr txBox="1"/>
           <p:nvPr>
             <p:ph idx="1" type="body"/>
@@ -1132,7 +1129,7 @@
       </p:grpSpPr>
       <p:sp>
         <p:nvSpPr>
-          <p:cNvPr id="173" name="Google Shape;173;g611cfcb12990f186_256:notes"/>
+          <p:cNvPr id="173" name="Google Shape;173;g1261dc1921a_0_1:notes"/>
           <p:cNvSpPr/>
           <p:nvPr>
             <p:ph idx="2" type="sldImg"/>
@@ -1167,304 +1164,7 @@
       </p:sp>
       <p:sp>
         <p:nvSpPr>
-          <p:cNvPr id="174" name="Google Shape;174;g611cfcb12990f186_256:notes"/>
-          <p:cNvSpPr txBox="1"/>
-          <p:nvPr>
-            <p:ph idx="1" type="body"/>
-          </p:nvPr>
-        </p:nvSpPr>
-        <p:spPr>
-          <a:xfrm>
-            <a:off x="685800" y="4343400"/>
-            <a:ext cx="5486400" cy="4114800"/>
-          </a:xfrm>
-          <a:prstGeom prst="rect">
-            <a:avLst/>
-          </a:prstGeom>
-        </p:spPr>
-        <p:txBody>
-          <a:bodyPr anchorCtr="0" anchor="t" bIns="91425" lIns="91425" spcFirstLastPara="1" rIns="91425" wrap="square" tIns="91425">
-            <a:noAutofit/>
-          </a:bodyPr>
-          <a:lstStyle/>
-          <a:p>
-            <a:pPr indent="0" lvl="0" marL="0" rtl="0" algn="l">
-              <a:spcBef>
-                <a:spcPts val="0"/>
-              </a:spcBef>
-              <a:spcAft>
-                <a:spcPts val="0"/>
-              </a:spcAft>
-              <a:buNone/>
-            </a:pPr>
-            <a:r>
-              <a:t/>
-            </a:r>
-            <a:endParaRPr/>
-          </a:p>
-        </p:txBody>
-      </p:sp>
-    </p:spTree>
-  </p:cSld>
-  <p:clrMapOvr>
-    <a:masterClrMapping/>
-  </p:clrMapOvr>
-</p:notes>
-</file>
-
-<file path=ppt/notesSlides/notesSlide14.xml><?xml version="1.0" encoding="utf-8"?>
-<p:notes xmlns:a="http://schemas.openxmlformats.org/drawingml/2006/main" xmlns:r="http://schemas.openxmlformats.org/officeDocument/2006/relationships" xmlns:mc="http://schemas.openxmlformats.org/markup-compatibility/2006" xmlns:mv="urn:schemas-microsoft-com:mac:vml" xmlns:p="http://schemas.openxmlformats.org/presentationml/2006/main" xmlns:c="http://schemas.openxmlformats.org/drawingml/2006/chart" xmlns:dgm="http://schemas.openxmlformats.org/drawingml/2006/diagram" xmlns:o="urn:schemas-microsoft-com:office:office" xmlns:v="urn:schemas-microsoft-com:vml" xmlns:pvml="urn:schemas-microsoft-com:office:powerpoint" xmlns:com="http://schemas.openxmlformats.org/drawingml/2006/compatibility" xmlns:p14="http://schemas.microsoft.com/office/powerpoint/2010/main" xmlns:p15="http://schemas.microsoft.com/office/powerpoint/2012/main" xmlns:ahyp="http://schemas.microsoft.com/office/drawing/2018/hyperlinkcolor" showMasterPhAnim="0" showMasterSp="0">
-  <p:cSld>
-    <p:spTree>
-      <p:nvGrpSpPr>
-        <p:cNvPr id="180" name="Shape 180"/>
-        <p:cNvGrpSpPr/>
-        <p:nvPr/>
-      </p:nvGrpSpPr>
-      <p:grpSpPr>
-        <a:xfrm>
-          <a:off x="0" y="0"/>
-          <a:ext cx="0" cy="0"/>
-          <a:chOff x="0" y="0"/>
-          <a:chExt cx="0" cy="0"/>
-        </a:xfrm>
-      </p:grpSpPr>
-      <p:sp>
-        <p:nvSpPr>
-          <p:cNvPr id="181" name="Google Shape;181;g611cfcb12990f186_171:notes"/>
-          <p:cNvSpPr/>
-          <p:nvPr>
-            <p:ph idx="2" type="sldImg"/>
-          </p:nvPr>
-        </p:nvSpPr>
-        <p:spPr>
-          <a:xfrm>
-            <a:off x="381300" y="685800"/>
-            <a:ext cx="6096000" cy="3429000"/>
-          </a:xfrm>
-          <a:custGeom>
-            <a:rect b="b" l="l" r="r" t="t"/>
-            <a:pathLst>
-              <a:path extrusionOk="0" h="120000" w="120000">
-                <a:moveTo>
-                  <a:pt x="0" y="0"/>
-                </a:moveTo>
-                <a:lnTo>
-                  <a:pt x="120000" y="0"/>
-                </a:lnTo>
-                <a:lnTo>
-                  <a:pt x="120000" y="120000"/>
-                </a:lnTo>
-                <a:lnTo>
-                  <a:pt x="0" y="120000"/>
-                </a:lnTo>
-                <a:close/>
-              </a:path>
-            </a:pathLst>
-          </a:custGeom>
-        </p:spPr>
-      </p:sp>
-      <p:sp>
-        <p:nvSpPr>
-          <p:cNvPr id="182" name="Google Shape;182;g611cfcb12990f186_171:notes"/>
-          <p:cNvSpPr txBox="1"/>
-          <p:nvPr>
-            <p:ph idx="1" type="body"/>
-          </p:nvPr>
-        </p:nvSpPr>
-        <p:spPr>
-          <a:xfrm>
-            <a:off x="685800" y="4343400"/>
-            <a:ext cx="5486400" cy="4114800"/>
-          </a:xfrm>
-          <a:prstGeom prst="rect">
-            <a:avLst/>
-          </a:prstGeom>
-        </p:spPr>
-        <p:txBody>
-          <a:bodyPr anchorCtr="0" anchor="t" bIns="91425" lIns="91425" spcFirstLastPara="1" rIns="91425" wrap="square" tIns="91425">
-            <a:noAutofit/>
-          </a:bodyPr>
-          <a:lstStyle/>
-          <a:p>
-            <a:pPr indent="0" lvl="0" marL="0" rtl="0" algn="l">
-              <a:spcBef>
-                <a:spcPts val="0"/>
-              </a:spcBef>
-              <a:spcAft>
-                <a:spcPts val="0"/>
-              </a:spcAft>
-              <a:buNone/>
-            </a:pPr>
-            <a:r>
-              <a:t/>
-            </a:r>
-            <a:endParaRPr/>
-          </a:p>
-        </p:txBody>
-      </p:sp>
-    </p:spTree>
-  </p:cSld>
-  <p:clrMapOvr>
-    <a:masterClrMapping/>
-  </p:clrMapOvr>
-</p:notes>
-</file>
-
-<file path=ppt/notesSlides/notesSlide15.xml><?xml version="1.0" encoding="utf-8"?>
-<p:notes xmlns:a="http://schemas.openxmlformats.org/drawingml/2006/main" xmlns:r="http://schemas.openxmlformats.org/officeDocument/2006/relationships" xmlns:mc="http://schemas.openxmlformats.org/markup-compatibility/2006" xmlns:mv="urn:schemas-microsoft-com:mac:vml" xmlns:p="http://schemas.openxmlformats.org/presentationml/2006/main" xmlns:c="http://schemas.openxmlformats.org/drawingml/2006/chart" xmlns:dgm="http://schemas.openxmlformats.org/drawingml/2006/diagram" xmlns:o="urn:schemas-microsoft-com:office:office" xmlns:v="urn:schemas-microsoft-com:vml" xmlns:pvml="urn:schemas-microsoft-com:office:powerpoint" xmlns:com="http://schemas.openxmlformats.org/drawingml/2006/compatibility" xmlns:p14="http://schemas.microsoft.com/office/powerpoint/2010/main" xmlns:p15="http://schemas.microsoft.com/office/powerpoint/2012/main" xmlns:ahyp="http://schemas.microsoft.com/office/drawing/2018/hyperlinkcolor" showMasterPhAnim="0" showMasterSp="0">
-  <p:cSld>
-    <p:spTree>
-      <p:nvGrpSpPr>
-        <p:cNvPr id="189" name="Shape 189"/>
-        <p:cNvGrpSpPr/>
-        <p:nvPr/>
-      </p:nvGrpSpPr>
-      <p:grpSpPr>
-        <a:xfrm>
-          <a:off x="0" y="0"/>
-          <a:ext cx="0" cy="0"/>
-          <a:chOff x="0" y="0"/>
-          <a:chExt cx="0" cy="0"/>
-        </a:xfrm>
-      </p:grpSpPr>
-      <p:sp>
-        <p:nvSpPr>
-          <p:cNvPr id="190" name="Google Shape;190;g611cfcb12990f186_275:notes"/>
-          <p:cNvSpPr/>
-          <p:nvPr>
-            <p:ph idx="2" type="sldImg"/>
-          </p:nvPr>
-        </p:nvSpPr>
-        <p:spPr>
-          <a:xfrm>
-            <a:off x="381300" y="685800"/>
-            <a:ext cx="6096000" cy="3429000"/>
-          </a:xfrm>
-          <a:custGeom>
-            <a:rect b="b" l="l" r="r" t="t"/>
-            <a:pathLst>
-              <a:path extrusionOk="0" h="120000" w="120000">
-                <a:moveTo>
-                  <a:pt x="0" y="0"/>
-                </a:moveTo>
-                <a:lnTo>
-                  <a:pt x="120000" y="0"/>
-                </a:lnTo>
-                <a:lnTo>
-                  <a:pt x="120000" y="120000"/>
-                </a:lnTo>
-                <a:lnTo>
-                  <a:pt x="0" y="120000"/>
-                </a:lnTo>
-                <a:close/>
-              </a:path>
-            </a:pathLst>
-          </a:custGeom>
-        </p:spPr>
-      </p:sp>
-      <p:sp>
-        <p:nvSpPr>
-          <p:cNvPr id="191" name="Google Shape;191;g611cfcb12990f186_275:notes"/>
-          <p:cNvSpPr txBox="1"/>
-          <p:nvPr>
-            <p:ph idx="1" type="body"/>
-          </p:nvPr>
-        </p:nvSpPr>
-        <p:spPr>
-          <a:xfrm>
-            <a:off x="685800" y="4343400"/>
-            <a:ext cx="5486400" cy="4114800"/>
-          </a:xfrm>
-          <a:prstGeom prst="rect">
-            <a:avLst/>
-          </a:prstGeom>
-        </p:spPr>
-        <p:txBody>
-          <a:bodyPr anchorCtr="0" anchor="t" bIns="91425" lIns="91425" spcFirstLastPara="1" rIns="91425" wrap="square" tIns="91425">
-            <a:noAutofit/>
-          </a:bodyPr>
-          <a:lstStyle/>
-          <a:p>
-            <a:pPr indent="0" lvl="0" marL="0" rtl="0" algn="l">
-              <a:spcBef>
-                <a:spcPts val="0"/>
-              </a:spcBef>
-              <a:spcAft>
-                <a:spcPts val="0"/>
-              </a:spcAft>
-              <a:buNone/>
-            </a:pPr>
-            <a:r>
-              <a:t/>
-            </a:r>
-            <a:endParaRPr/>
-          </a:p>
-        </p:txBody>
-      </p:sp>
-    </p:spTree>
-  </p:cSld>
-  <p:clrMapOvr>
-    <a:masterClrMapping/>
-  </p:clrMapOvr>
-</p:notes>
-</file>
-
-<file path=ppt/notesSlides/notesSlide16.xml><?xml version="1.0" encoding="utf-8"?>
-<p:notes xmlns:a="http://schemas.openxmlformats.org/drawingml/2006/main" xmlns:r="http://schemas.openxmlformats.org/officeDocument/2006/relationships" xmlns:mc="http://schemas.openxmlformats.org/markup-compatibility/2006" xmlns:mv="urn:schemas-microsoft-com:mac:vml" xmlns:p="http://schemas.openxmlformats.org/presentationml/2006/main" xmlns:c="http://schemas.openxmlformats.org/drawingml/2006/chart" xmlns:dgm="http://schemas.openxmlformats.org/drawingml/2006/diagram" xmlns:o="urn:schemas-microsoft-com:office:office" xmlns:v="urn:schemas-microsoft-com:vml" xmlns:pvml="urn:schemas-microsoft-com:office:powerpoint" xmlns:com="http://schemas.openxmlformats.org/drawingml/2006/compatibility" xmlns:p14="http://schemas.microsoft.com/office/powerpoint/2010/main" xmlns:p15="http://schemas.microsoft.com/office/powerpoint/2012/main" xmlns:ahyp="http://schemas.microsoft.com/office/drawing/2018/hyperlinkcolor" showMasterPhAnim="0" showMasterSp="0">
-  <p:cSld>
-    <p:spTree>
-      <p:nvGrpSpPr>
-        <p:cNvPr id="195" name="Shape 195"/>
-        <p:cNvGrpSpPr/>
-        <p:nvPr/>
-      </p:nvGrpSpPr>
-      <p:grpSpPr>
-        <a:xfrm>
-          <a:off x="0" y="0"/>
-          <a:ext cx="0" cy="0"/>
-          <a:chOff x="0" y="0"/>
-          <a:chExt cx="0" cy="0"/>
-        </a:xfrm>
-      </p:grpSpPr>
-      <p:sp>
-        <p:nvSpPr>
-          <p:cNvPr id="196" name="Google Shape;196;g1261dc1921a_0_1:notes"/>
-          <p:cNvSpPr/>
-          <p:nvPr>
-            <p:ph idx="2" type="sldImg"/>
-          </p:nvPr>
-        </p:nvSpPr>
-        <p:spPr>
-          <a:xfrm>
-            <a:off x="381300" y="685800"/>
-            <a:ext cx="6096000" cy="3429000"/>
-          </a:xfrm>
-          <a:custGeom>
-            <a:rect b="b" l="l" r="r" t="t"/>
-            <a:pathLst>
-              <a:path extrusionOk="0" h="120000" w="120000">
-                <a:moveTo>
-                  <a:pt x="0" y="0"/>
-                </a:moveTo>
-                <a:lnTo>
-                  <a:pt x="120000" y="0"/>
-                </a:lnTo>
-                <a:lnTo>
-                  <a:pt x="120000" y="120000"/>
-                </a:lnTo>
-                <a:lnTo>
-                  <a:pt x="0" y="120000"/>
-                </a:lnTo>
-                <a:close/>
-              </a:path>
-            </a:pathLst>
-          </a:custGeom>
-        </p:spPr>
-      </p:sp>
-      <p:sp>
-        <p:nvSpPr>
-          <p:cNvPr id="197" name="Google Shape;197;g1261dc1921a_0_1:notes"/>
+          <p:cNvPr id="174" name="Google Shape;174;g1261dc1921a_0_1:notes"/>
           <p:cNvSpPr txBox="1"/>
           <p:nvPr>
             <p:ph idx="1" type="body"/>
@@ -1627,7 +1327,7 @@
       </p:grpSpPr>
       <p:sp>
         <p:nvSpPr>
-          <p:cNvPr id="95" name="Google Shape;95;g125f479ed05_0_124:notes"/>
+          <p:cNvPr id="95" name="Google Shape;95;g611cfcb12990f186_265:notes"/>
           <p:cNvSpPr/>
           <p:nvPr>
             <p:ph idx="2" type="sldImg"/>
@@ -1662,7 +1362,7 @@
       </p:sp>
       <p:sp>
         <p:nvSpPr>
-          <p:cNvPr id="96" name="Google Shape;96;g125f479ed05_0_124:notes"/>
+          <p:cNvPr id="96" name="Google Shape;96;g611cfcb12990f186_265:notes"/>
           <p:cNvSpPr txBox="1"/>
           <p:nvPr>
             <p:ph idx="1" type="body"/>
@@ -1712,7 +1412,7 @@
   <p:cSld>
     <p:spTree>
       <p:nvGrpSpPr>
-        <p:cNvPr id="108" name="Shape 108"/>
+        <p:cNvPr id="100" name="Shape 100"/>
         <p:cNvGrpSpPr/>
         <p:nvPr/>
       </p:nvGrpSpPr>
@@ -1726,7 +1426,7 @@
       </p:grpSpPr>
       <p:sp>
         <p:nvSpPr>
-          <p:cNvPr id="109" name="Google Shape;109;g125f479ed05_0_83:notes"/>
+          <p:cNvPr id="101" name="Google Shape;101;g125f479ed05_0_124:notes"/>
           <p:cNvSpPr/>
           <p:nvPr>
             <p:ph idx="2" type="sldImg"/>
@@ -1761,7 +1461,7 @@
       </p:sp>
       <p:sp>
         <p:nvSpPr>
-          <p:cNvPr id="110" name="Google Shape;110;g125f479ed05_0_83:notes"/>
+          <p:cNvPr id="102" name="Google Shape;102;g125f479ed05_0_124:notes"/>
           <p:cNvSpPr txBox="1"/>
           <p:nvPr>
             <p:ph idx="1" type="body"/>
@@ -1811,7 +1511,7 @@
   <p:cSld>
     <p:spTree>
       <p:nvGrpSpPr>
-        <p:cNvPr id="116" name="Shape 116"/>
+        <p:cNvPr id="113" name="Shape 113"/>
         <p:cNvGrpSpPr/>
         <p:nvPr/>
       </p:nvGrpSpPr>
@@ -1825,7 +1525,7 @@
       </p:grpSpPr>
       <p:sp>
         <p:nvSpPr>
-          <p:cNvPr id="117" name="Google Shape;117;g12277e66c73_0_4:notes"/>
+          <p:cNvPr id="114" name="Google Shape;114;g611cfcb12990f186_280:notes"/>
           <p:cNvSpPr/>
           <p:nvPr>
             <p:ph idx="2" type="sldImg"/>
@@ -1860,7 +1560,7 @@
       </p:sp>
       <p:sp>
         <p:nvSpPr>
-          <p:cNvPr id="118" name="Google Shape;118;g12277e66c73_0_4:notes"/>
+          <p:cNvPr id="115" name="Google Shape;115;g611cfcb12990f186_280:notes"/>
           <p:cNvSpPr txBox="1"/>
           <p:nvPr>
             <p:ph idx="1" type="body"/>
@@ -1910,7 +1610,7 @@
   <p:cSld>
     <p:spTree>
       <p:nvGrpSpPr>
-        <p:cNvPr id="123" name="Shape 123"/>
+        <p:cNvPr id="122" name="Shape 122"/>
         <p:cNvGrpSpPr/>
         <p:nvPr/>
       </p:nvGrpSpPr>
@@ -1924,7 +1624,7 @@
       </p:grpSpPr>
       <p:sp>
         <p:nvSpPr>
-          <p:cNvPr id="124" name="Google Shape;124;g125f479ed05_2_8:notes"/>
+          <p:cNvPr id="123" name="Google Shape;123;g611cfcb12990f186_0:notes"/>
           <p:cNvSpPr/>
           <p:nvPr>
             <p:ph idx="2" type="sldImg"/>
@@ -1959,7 +1659,7 @@
       </p:sp>
       <p:sp>
         <p:nvSpPr>
-          <p:cNvPr id="125" name="Google Shape;125;g125f479ed05_2_8:notes"/>
+          <p:cNvPr id="124" name="Google Shape;124;g611cfcb12990f186_0:notes"/>
           <p:cNvSpPr txBox="1"/>
           <p:nvPr>
             <p:ph idx="1" type="body"/>
@@ -2009,7 +1709,7 @@
   <p:cSld>
     <p:spTree>
       <p:nvGrpSpPr>
-        <p:cNvPr id="130" name="Shape 130"/>
+        <p:cNvPr id="129" name="Shape 129"/>
         <p:cNvGrpSpPr/>
         <p:nvPr/>
       </p:nvGrpSpPr>
@@ -2023,7 +1723,7 @@
       </p:grpSpPr>
       <p:sp>
         <p:nvSpPr>
-          <p:cNvPr id="131" name="Google Shape;131;g611cfcb12990f186_265:notes"/>
+          <p:cNvPr id="130" name="Google Shape;130;g611cfcb12990f186_256:notes"/>
           <p:cNvSpPr/>
           <p:nvPr>
             <p:ph idx="2" type="sldImg"/>
@@ -2058,7 +1758,7 @@
       </p:sp>
       <p:sp>
         <p:nvSpPr>
-          <p:cNvPr id="132" name="Google Shape;132;g611cfcb12990f186_265:notes"/>
+          <p:cNvPr id="131" name="Google Shape;131;g611cfcb12990f186_256:notes"/>
           <p:cNvSpPr txBox="1"/>
           <p:nvPr>
             <p:ph idx="1" type="body"/>
@@ -2122,7 +1822,7 @@
       </p:grpSpPr>
       <p:sp>
         <p:nvSpPr>
-          <p:cNvPr id="138" name="Google Shape;138;g611cfcb12990f186_288:notes"/>
+          <p:cNvPr id="138" name="Google Shape;138;g611cfcb12990f186_171:notes"/>
           <p:cNvSpPr/>
           <p:nvPr>
             <p:ph idx="2" type="sldImg"/>
@@ -2157,7 +1857,7 @@
       </p:sp>
       <p:sp>
         <p:nvSpPr>
-          <p:cNvPr id="139" name="Google Shape;139;g611cfcb12990f186_288:notes"/>
+          <p:cNvPr id="139" name="Google Shape;139;g611cfcb12990f186_171:notes"/>
           <p:cNvSpPr txBox="1"/>
           <p:nvPr>
             <p:ph idx="1" type="body"/>
@@ -2207,7 +1907,7 @@
   <p:cSld>
     <p:spTree>
       <p:nvGrpSpPr>
-        <p:cNvPr id="144" name="Shape 144"/>
+        <p:cNvPr id="146" name="Shape 146"/>
         <p:cNvGrpSpPr/>
         <p:nvPr/>
       </p:nvGrpSpPr>
@@ -2221,7 +1921,7 @@
       </p:grpSpPr>
       <p:sp>
         <p:nvSpPr>
-          <p:cNvPr id="145" name="Google Shape;145;g125f479ed05_0_108:notes"/>
+          <p:cNvPr id="147" name="Google Shape;147;g125f479ed05_0_108:notes"/>
           <p:cNvSpPr/>
           <p:nvPr>
             <p:ph idx="2" type="sldImg"/>
@@ -2256,7 +1956,7 @@
       </p:sp>
       <p:sp>
         <p:nvSpPr>
-          <p:cNvPr id="146" name="Google Shape;146;g125f479ed05_0_108:notes"/>
+          <p:cNvPr id="148" name="Google Shape;148;g125f479ed05_0_108:notes"/>
           <p:cNvSpPr txBox="1"/>
           <p:nvPr>
             <p:ph idx="1" type="body"/>
@@ -8729,7 +8429,7 @@
   <p:cSld>
     <p:spTree>
       <p:nvGrpSpPr>
-        <p:cNvPr id="153" name="Shape 153"/>
+        <p:cNvPr id="155" name="Shape 155"/>
         <p:cNvGrpSpPr/>
         <p:nvPr/>
       </p:nvGrpSpPr>
@@ -8743,7 +8443,7 @@
       </p:grpSpPr>
       <p:sp>
         <p:nvSpPr>
-          <p:cNvPr id="154" name="Google Shape;154;p22"/>
+          <p:cNvPr id="156" name="Google Shape;156;p22"/>
           <p:cNvSpPr txBox="1"/>
           <p:nvPr>
             <p:ph type="title"/>
@@ -8783,7 +8483,7 @@
       </p:sp>
       <p:sp>
         <p:nvSpPr>
-          <p:cNvPr id="155" name="Google Shape;155;p22"/>
+          <p:cNvPr id="157" name="Google Shape;157;p22"/>
           <p:cNvSpPr txBox="1"/>
           <p:nvPr>
             <p:ph idx="1" type="body"/>
@@ -8824,7 +8524,7 @@
             </a:r>
             <a:r>
               <a:rPr lang="en"/>
-              <a:t> a fourth </a:t>
+              <a:t> the fourth </a:t>
             </a:r>
             <a:r>
               <a:rPr lang="en"/>
@@ -8930,7 +8630,7 @@
   <p:cSld>
     <p:spTree>
       <p:nvGrpSpPr>
-        <p:cNvPr id="159" name="Shape 159"/>
+        <p:cNvPr id="161" name="Shape 161"/>
         <p:cNvGrpSpPr/>
         <p:nvPr/>
       </p:nvGrpSpPr>
@@ -8944,7 +8644,7 @@
       </p:grpSpPr>
       <p:sp>
         <p:nvSpPr>
-          <p:cNvPr id="160" name="Google Shape;160;p23"/>
+          <p:cNvPr id="162" name="Google Shape;162;p23"/>
           <p:cNvSpPr txBox="1"/>
           <p:nvPr>
             <p:ph type="title"/>
@@ -8976,7 +8676,22 @@
             </a:pPr>
             <a:r>
               <a:rPr lang="en"/>
-              <a:t>Hypothesis 1</a:t>
+              <a:t>Github repo</a:t>
+            </a:r>
+            <a:endParaRPr/>
+          </a:p>
+          <a:p>
+            <a:pPr indent="0" lvl="0" marL="0" rtl="0" algn="l">
+              <a:spcBef>
+                <a:spcPts val="0"/>
+              </a:spcBef>
+              <a:spcAft>
+                <a:spcPts val="0"/>
+              </a:spcAft>
+              <a:buNone/>
+            </a:pPr>
+            <a:r>
+              <a:t/>
             </a:r>
             <a:endParaRPr/>
           </a:p>
@@ -8984,7 +8699,7 @@
       </p:sp>
       <p:sp>
         <p:nvSpPr>
-          <p:cNvPr id="161" name="Google Shape;161;p23"/>
+          <p:cNvPr id="163" name="Google Shape;163;p23"/>
           <p:cNvSpPr txBox="1"/>
           <p:nvPr>
             <p:ph idx="1" type="body"/>
@@ -8993,7 +8708,7 @@
         <p:spPr>
           <a:xfrm>
             <a:off x="729450" y="2078875"/>
-            <a:ext cx="7892100" cy="747600"/>
+            <a:ext cx="3123000" cy="2261100"/>
           </a:xfrm>
           <a:prstGeom prst="rect">
             <a:avLst/>
@@ -9016,7 +8731,7 @@
             </a:pPr>
             <a:r>
               <a:rPr lang="en"/>
-              <a:t>Seeing if there is an indicator that can be used in finding PFAS in the water</a:t>
+              <a:t>Our updated Github, with all of information,  link to website, documents, our notebooks and our datasets. The readme goes into more depth of our project and our purpose, our teams and some of the technologies we used.</a:t>
             </a:r>
             <a:endParaRPr/>
           </a:p>
@@ -9024,7 +8739,7 @@
       </p:sp>
       <p:pic>
         <p:nvPicPr>
-          <p:cNvPr id="162" name="Google Shape;162;p23"/>
+          <p:cNvPr id="164" name="Google Shape;164;p23"/>
           <p:cNvPicPr preferRelativeResize="0"/>
           <p:nvPr/>
         </p:nvPicPr>
@@ -9038,8 +8753,8 @@
         </p:blipFill>
         <p:spPr>
           <a:xfrm>
-            <a:off x="6345675" y="3104225"/>
-            <a:ext cx="2798325" cy="2039275"/>
+            <a:off x="4905688" y="943000"/>
+            <a:ext cx="3557374" cy="1135875"/>
           </a:xfrm>
           <a:prstGeom prst="rect">
             <a:avLst/>
@@ -9052,39 +8767,12 @@
       </p:pic>
       <p:pic>
         <p:nvPicPr>
-          <p:cNvPr id="163" name="Google Shape;163;p23"/>
-          <p:cNvPicPr preferRelativeResize="0"/>
-          <p:nvPr/>
-        </p:nvPicPr>
-        <p:blipFill rotWithShape="1">
-          <a:blip r:embed="rId4">
-            <a:alphaModFix/>
-          </a:blip>
-          <a:srcRect b="17603" l="17507" r="22900" t="29547"/>
-          <a:stretch/>
-        </p:blipFill>
-        <p:spPr>
-          <a:xfrm>
-            <a:off x="2865200" y="3206188"/>
-            <a:ext cx="3413601" cy="1835350"/>
-          </a:xfrm>
-          <a:prstGeom prst="rect">
-            <a:avLst/>
-          </a:prstGeom>
-          <a:noFill/>
-          <a:ln>
-            <a:noFill/>
-          </a:ln>
-        </p:spPr>
-      </p:pic>
-      <p:pic>
-        <p:nvPicPr>
-          <p:cNvPr id="164" name="Google Shape;164;p23"/>
+          <p:cNvPr id="165" name="Google Shape;165;p23"/>
           <p:cNvPicPr preferRelativeResize="0"/>
           <p:nvPr/>
         </p:nvPicPr>
         <p:blipFill>
-          <a:blip r:embed="rId5">
+          <a:blip r:embed="rId4">
             <a:alphaModFix/>
           </a:blip>
           <a:stretch>
@@ -9093,8 +8781,8 @@
         </p:blipFill>
         <p:spPr>
           <a:xfrm>
-            <a:off x="0" y="3104225"/>
-            <a:ext cx="2798328" cy="2039275"/>
+            <a:off x="4950600" y="2179200"/>
+            <a:ext cx="3467549" cy="2759823"/>
           </a:xfrm>
           <a:prstGeom prst="rect">
             <a:avLst/>
@@ -9118,7 +8806,7 @@
   <p:cSld>
     <p:spTree>
       <p:nvGrpSpPr>
-        <p:cNvPr id="168" name="Shape 168"/>
+        <p:cNvPr id="169" name="Shape 169"/>
         <p:cNvGrpSpPr/>
         <p:nvPr/>
       </p:nvGrpSpPr>
@@ -9132,7 +8820,7 @@
       </p:grpSpPr>
       <p:sp>
         <p:nvSpPr>
-          <p:cNvPr id="169" name="Google Shape;169;p24"/>
+          <p:cNvPr id="170" name="Google Shape;170;p24"/>
           <p:cNvSpPr txBox="1"/>
           <p:nvPr>
             <p:ph type="title"/>
@@ -9164,47 +8852,7 @@
             </a:pPr>
             <a:r>
               <a:rPr lang="en"/>
-              <a:t>Hypothesis 2</a:t>
-            </a:r>
-            <a:endParaRPr/>
-          </a:p>
-        </p:txBody>
-      </p:sp>
-      <p:sp>
-        <p:nvSpPr>
-          <p:cNvPr id="170" name="Google Shape;170;p24"/>
-          <p:cNvSpPr txBox="1"/>
-          <p:nvPr>
-            <p:ph idx="1" type="body"/>
-          </p:nvPr>
-        </p:nvSpPr>
-        <p:spPr>
-          <a:xfrm>
-            <a:off x="729450" y="2078875"/>
-            <a:ext cx="2776500" cy="2261100"/>
-          </a:xfrm>
-          <a:prstGeom prst="rect">
-            <a:avLst/>
-          </a:prstGeom>
-        </p:spPr>
-        <p:txBody>
-          <a:bodyPr anchorCtr="0" anchor="t" bIns="91425" lIns="91425" spcFirstLastPara="1" rIns="91425" wrap="square" tIns="91425">
-            <a:normAutofit/>
-          </a:bodyPr>
-          <a:lstStyle/>
-          <a:p>
-            <a:pPr indent="0" lvl="0" marL="0" rtl="0" algn="l">
-              <a:spcBef>
-                <a:spcPts val="0"/>
-              </a:spcBef>
-              <a:spcAft>
-                <a:spcPts val="1200"/>
-              </a:spcAft>
-              <a:buNone/>
-            </a:pPr>
-            <a:r>
-              <a:rPr lang="en"/>
-              <a:t>See if there is a growth in people exposed to pfas in 2013 and 2016</a:t>
+              <a:t>Poster </a:t>
             </a:r>
             <a:endParaRPr/>
           </a:p>
@@ -9216,18 +8864,17 @@
           <p:cNvPicPr preferRelativeResize="0"/>
           <p:nvPr/>
         </p:nvPicPr>
-        <p:blipFill>
+        <p:blipFill rotWithShape="1">
           <a:blip r:embed="rId3">
             <a:alphaModFix/>
           </a:blip>
-          <a:stretch>
-            <a:fillRect/>
-          </a:stretch>
+          <a:srcRect b="0" l="0" r="0" t="0"/>
+          <a:stretch/>
         </p:blipFill>
         <p:spPr>
           <a:xfrm>
-            <a:off x="4156450" y="1355125"/>
-            <a:ext cx="4261702" cy="2984850"/>
+            <a:off x="2644965" y="-12"/>
+            <a:ext cx="3857672" cy="5143501"/>
           </a:xfrm>
           <a:prstGeom prst="rect">
             <a:avLst/>
@@ -9263,465 +8910,9 @@
           <a:chExt cx="0" cy="0"/>
         </a:xfrm>
       </p:grpSpPr>
-      <p:sp>
-        <p:nvSpPr>
-          <p:cNvPr id="176" name="Google Shape;176;p25"/>
-          <p:cNvSpPr txBox="1"/>
-          <p:nvPr>
-            <p:ph type="title"/>
-          </p:nvPr>
-        </p:nvSpPr>
-        <p:spPr>
-          <a:xfrm>
-            <a:off x="729450" y="1318650"/>
-            <a:ext cx="7688700" cy="535200"/>
-          </a:xfrm>
-          <a:prstGeom prst="rect">
-            <a:avLst/>
-          </a:prstGeom>
-        </p:spPr>
-        <p:txBody>
-          <a:bodyPr anchorCtr="0" anchor="t" bIns="91425" lIns="91425" spcFirstLastPara="1" rIns="91425" wrap="square" tIns="91425">
-            <a:normAutofit fontScale="90000"/>
-          </a:bodyPr>
-          <a:lstStyle/>
-          <a:p>
-            <a:pPr indent="0" lvl="0" marL="0" rtl="0" algn="l">
-              <a:spcBef>
-                <a:spcPts val="0"/>
-              </a:spcBef>
-              <a:spcAft>
-                <a:spcPts val="0"/>
-              </a:spcAft>
-              <a:buNone/>
-            </a:pPr>
-            <a:r>
-              <a:rPr lang="en"/>
-              <a:t>Extended graphs for Hypo 3 </a:t>
-            </a:r>
-            <a:endParaRPr/>
-          </a:p>
-        </p:txBody>
-      </p:sp>
-      <p:sp>
-        <p:nvSpPr>
-          <p:cNvPr id="177" name="Google Shape;177;p25"/>
-          <p:cNvSpPr txBox="1"/>
-          <p:nvPr>
-            <p:ph idx="1" type="body"/>
-          </p:nvPr>
-        </p:nvSpPr>
-        <p:spPr>
-          <a:xfrm>
-            <a:off x="729450" y="2078875"/>
-            <a:ext cx="2664900" cy="2261100"/>
-          </a:xfrm>
-          <a:prstGeom prst="rect">
-            <a:avLst/>
-          </a:prstGeom>
-        </p:spPr>
-        <p:txBody>
-          <a:bodyPr anchorCtr="0" anchor="t" bIns="91425" lIns="91425" spcFirstLastPara="1" rIns="91425" wrap="square" tIns="91425">
-            <a:normAutofit/>
-          </a:bodyPr>
-          <a:lstStyle/>
-          <a:p>
-            <a:pPr indent="0" lvl="0" marL="0" rtl="0" algn="l">
-              <a:spcBef>
-                <a:spcPts val="0"/>
-              </a:spcBef>
-              <a:spcAft>
-                <a:spcPts val="1200"/>
-              </a:spcAft>
-              <a:buNone/>
-            </a:pPr>
-            <a:r>
-              <a:t/>
-            </a:r>
-            <a:endParaRPr/>
-          </a:p>
-        </p:txBody>
-      </p:sp>
       <p:pic>
         <p:nvPicPr>
-          <p:cNvPr id="178" name="Google Shape;178;p25"/>
-          <p:cNvPicPr preferRelativeResize="0"/>
-          <p:nvPr/>
-        </p:nvPicPr>
-        <p:blipFill>
-          <a:blip r:embed="rId3">
-            <a:alphaModFix/>
-          </a:blip>
-          <a:stretch>
-            <a:fillRect/>
-          </a:stretch>
-        </p:blipFill>
-        <p:spPr>
-          <a:xfrm>
-            <a:off x="4683425" y="1853850"/>
-            <a:ext cx="4230975" cy="3111675"/>
-          </a:xfrm>
-          <a:prstGeom prst="rect">
-            <a:avLst/>
-          </a:prstGeom>
-          <a:noFill/>
-          <a:ln>
-            <a:noFill/>
-          </a:ln>
-        </p:spPr>
-      </p:pic>
-      <p:pic>
-        <p:nvPicPr>
-          <p:cNvPr id="179" name="Google Shape;179;p25"/>
-          <p:cNvPicPr preferRelativeResize="0"/>
-          <p:nvPr/>
-        </p:nvPicPr>
-        <p:blipFill>
-          <a:blip r:embed="rId4">
-            <a:alphaModFix/>
-          </a:blip>
-          <a:stretch>
-            <a:fillRect/>
-          </a:stretch>
-        </p:blipFill>
-        <p:spPr>
-          <a:xfrm>
-            <a:off x="467150" y="2078875"/>
-            <a:ext cx="4015724" cy="2354975"/>
-          </a:xfrm>
-          <a:prstGeom prst="rect">
-            <a:avLst/>
-          </a:prstGeom>
-          <a:noFill/>
-          <a:ln>
-            <a:noFill/>
-          </a:ln>
-        </p:spPr>
-      </p:pic>
-    </p:spTree>
-  </p:cSld>
-  <p:clrMapOvr>
-    <a:masterClrMapping/>
-  </p:clrMapOvr>
-</p:sld>
-</file>
-
-<file path=ppt/slides/slide14.xml><?xml version="1.0" encoding="utf-8"?>
-<p:sld xmlns:a="http://schemas.openxmlformats.org/drawingml/2006/main" xmlns:r="http://schemas.openxmlformats.org/officeDocument/2006/relationships" xmlns:mc="http://schemas.openxmlformats.org/markup-compatibility/2006" xmlns:mv="urn:schemas-microsoft-com:mac:vml" xmlns:p="http://schemas.openxmlformats.org/presentationml/2006/main" xmlns:c="http://schemas.openxmlformats.org/drawingml/2006/chart" xmlns:dgm="http://schemas.openxmlformats.org/drawingml/2006/diagram" xmlns:o="urn:schemas-microsoft-com:office:office" xmlns:v="urn:schemas-microsoft-com:vml" xmlns:pvml="urn:schemas-microsoft-com:office:powerpoint" xmlns:com="http://schemas.openxmlformats.org/drawingml/2006/compatibility" xmlns:p14="http://schemas.microsoft.com/office/powerpoint/2010/main" xmlns:p15="http://schemas.microsoft.com/office/powerpoint/2012/main" xmlns:ahyp="http://schemas.microsoft.com/office/drawing/2018/hyperlinkcolor">
-  <p:cSld>
-    <p:spTree>
-      <p:nvGrpSpPr>
-        <p:cNvPr id="183" name="Shape 183"/>
-        <p:cNvGrpSpPr/>
-        <p:nvPr/>
-      </p:nvGrpSpPr>
-      <p:grpSpPr>
-        <a:xfrm>
-          <a:off x="0" y="0"/>
-          <a:ext cx="0" cy="0"/>
-          <a:chOff x="0" y="0"/>
-          <a:chExt cx="0" cy="0"/>
-        </a:xfrm>
-      </p:grpSpPr>
-      <p:sp>
-        <p:nvSpPr>
-          <p:cNvPr id="184" name="Google Shape;184;p26"/>
-          <p:cNvSpPr txBox="1"/>
-          <p:nvPr>
-            <p:ph type="title"/>
-          </p:nvPr>
-        </p:nvSpPr>
-        <p:spPr>
-          <a:xfrm>
-            <a:off x="729450" y="1318650"/>
-            <a:ext cx="7688700" cy="535200"/>
-          </a:xfrm>
-          <a:prstGeom prst="rect">
-            <a:avLst/>
-          </a:prstGeom>
-        </p:spPr>
-        <p:txBody>
-          <a:bodyPr anchorCtr="0" anchor="t" bIns="91425" lIns="91425" spcFirstLastPara="1" rIns="91425" wrap="square" tIns="91425">
-            <a:normAutofit fontScale="90000"/>
-          </a:bodyPr>
-          <a:lstStyle/>
-          <a:p>
-            <a:pPr indent="0" lvl="0" marL="0" rtl="0" algn="l">
-              <a:spcBef>
-                <a:spcPts val="0"/>
-              </a:spcBef>
-              <a:spcAft>
-                <a:spcPts val="0"/>
-              </a:spcAft>
-              <a:buNone/>
-            </a:pPr>
-            <a:r>
-              <a:rPr lang="en"/>
-              <a:t>Hypothesis 4</a:t>
-            </a:r>
-            <a:endParaRPr/>
-          </a:p>
-        </p:txBody>
-      </p:sp>
-      <p:sp>
-        <p:nvSpPr>
-          <p:cNvPr id="185" name="Google Shape;185;p26"/>
-          <p:cNvSpPr txBox="1"/>
-          <p:nvPr>
-            <p:ph idx="1" type="body"/>
-          </p:nvPr>
-        </p:nvSpPr>
-        <p:spPr>
-          <a:xfrm>
-            <a:off x="729450" y="2078875"/>
-            <a:ext cx="7688700" cy="2261100"/>
-          </a:xfrm>
-          <a:prstGeom prst="rect">
-            <a:avLst/>
-          </a:prstGeom>
-        </p:spPr>
-        <p:txBody>
-          <a:bodyPr anchorCtr="0" anchor="t" bIns="91425" lIns="91425" spcFirstLastPara="1" rIns="91425" wrap="square" tIns="91425">
-            <a:normAutofit/>
-          </a:bodyPr>
-          <a:lstStyle/>
-          <a:p>
-            <a:pPr indent="0" lvl="0" marL="0" rtl="0" algn="l">
-              <a:spcBef>
-                <a:spcPts val="0"/>
-              </a:spcBef>
-              <a:spcAft>
-                <a:spcPts val="0"/>
-              </a:spcAft>
-              <a:buNone/>
-            </a:pPr>
-            <a:r>
-              <a:rPr lang="en"/>
-              <a:t>To see where the most traces of pfas occurred within the state of GA</a:t>
-            </a:r>
-            <a:endParaRPr/>
-          </a:p>
-          <a:p>
-            <a:pPr indent="0" lvl="0" marL="0" rtl="0" algn="l">
-              <a:spcBef>
-                <a:spcPts val="1200"/>
-              </a:spcBef>
-              <a:spcAft>
-                <a:spcPts val="1200"/>
-              </a:spcAft>
-              <a:buNone/>
-            </a:pPr>
-            <a:r>
-              <a:t/>
-            </a:r>
-            <a:endParaRPr/>
-          </a:p>
-        </p:txBody>
-      </p:sp>
-      <p:pic>
-        <p:nvPicPr>
-          <p:cNvPr id="186" name="Google Shape;186;p26"/>
-          <p:cNvPicPr preferRelativeResize="0"/>
-          <p:nvPr/>
-        </p:nvPicPr>
-        <p:blipFill>
-          <a:blip r:embed="rId3">
-            <a:alphaModFix/>
-          </a:blip>
-          <a:stretch>
-            <a:fillRect/>
-          </a:stretch>
-        </p:blipFill>
-        <p:spPr>
-          <a:xfrm>
-            <a:off x="572625" y="2433422"/>
-            <a:ext cx="3693700" cy="1972275"/>
-          </a:xfrm>
-          <a:prstGeom prst="rect">
-            <a:avLst/>
-          </a:prstGeom>
-          <a:noFill/>
-          <a:ln>
-            <a:noFill/>
-          </a:ln>
-        </p:spPr>
-      </p:pic>
-      <p:pic>
-        <p:nvPicPr>
-          <p:cNvPr id="187" name="Google Shape;187;p26"/>
-          <p:cNvPicPr preferRelativeResize="0"/>
-          <p:nvPr/>
-        </p:nvPicPr>
-        <p:blipFill>
-          <a:blip r:embed="rId4">
-            <a:alphaModFix/>
-          </a:blip>
-          <a:stretch>
-            <a:fillRect/>
-          </a:stretch>
-        </p:blipFill>
-        <p:spPr>
-          <a:xfrm>
-            <a:off x="4066951" y="2511500"/>
-            <a:ext cx="2344026" cy="2407500"/>
-          </a:xfrm>
-          <a:prstGeom prst="rect">
-            <a:avLst/>
-          </a:prstGeom>
-          <a:noFill/>
-          <a:ln>
-            <a:noFill/>
-          </a:ln>
-        </p:spPr>
-      </p:pic>
-      <p:pic>
-        <p:nvPicPr>
-          <p:cNvPr id="188" name="Google Shape;188;p26"/>
-          <p:cNvPicPr preferRelativeResize="0"/>
-          <p:nvPr/>
-        </p:nvPicPr>
-        <p:blipFill>
-          <a:blip r:embed="rId5">
-            <a:alphaModFix/>
-          </a:blip>
-          <a:stretch>
-            <a:fillRect/>
-          </a:stretch>
-        </p:blipFill>
-        <p:spPr>
-          <a:xfrm>
-            <a:off x="6317921" y="2078862"/>
-            <a:ext cx="2590600" cy="2797251"/>
-          </a:xfrm>
-          <a:prstGeom prst="rect">
-            <a:avLst/>
-          </a:prstGeom>
-          <a:noFill/>
-          <a:ln>
-            <a:noFill/>
-          </a:ln>
-        </p:spPr>
-      </p:pic>
-    </p:spTree>
-  </p:cSld>
-  <p:clrMapOvr>
-    <a:masterClrMapping/>
-  </p:clrMapOvr>
-</p:sld>
-</file>
-
-<file path=ppt/slides/slide15.xml><?xml version="1.0" encoding="utf-8"?>
-<p:sld xmlns:a="http://schemas.openxmlformats.org/drawingml/2006/main" xmlns:r="http://schemas.openxmlformats.org/officeDocument/2006/relationships" xmlns:mc="http://schemas.openxmlformats.org/markup-compatibility/2006" xmlns:mv="urn:schemas-microsoft-com:mac:vml" xmlns:p="http://schemas.openxmlformats.org/presentationml/2006/main" xmlns:c="http://schemas.openxmlformats.org/drawingml/2006/chart" xmlns:dgm="http://schemas.openxmlformats.org/drawingml/2006/diagram" xmlns:o="urn:schemas-microsoft-com:office:office" xmlns:v="urn:schemas-microsoft-com:vml" xmlns:pvml="urn:schemas-microsoft-com:office:powerpoint" xmlns:com="http://schemas.openxmlformats.org/drawingml/2006/compatibility" xmlns:p14="http://schemas.microsoft.com/office/powerpoint/2010/main" xmlns:p15="http://schemas.microsoft.com/office/powerpoint/2012/main" xmlns:ahyp="http://schemas.microsoft.com/office/drawing/2018/hyperlinkcolor">
-  <p:cSld>
-    <p:spTree>
-      <p:nvGrpSpPr>
-        <p:cNvPr id="192" name="Shape 192"/>
-        <p:cNvGrpSpPr/>
-        <p:nvPr/>
-      </p:nvGrpSpPr>
-      <p:grpSpPr>
-        <a:xfrm>
-          <a:off x="0" y="0"/>
-          <a:ext cx="0" cy="0"/>
-          <a:chOff x="0" y="0"/>
-          <a:chExt cx="0" cy="0"/>
-        </a:xfrm>
-      </p:grpSpPr>
-      <p:sp>
-        <p:nvSpPr>
-          <p:cNvPr id="193" name="Google Shape;193;p27"/>
-          <p:cNvSpPr txBox="1"/>
-          <p:nvPr>
-            <p:ph type="title"/>
-          </p:nvPr>
-        </p:nvSpPr>
-        <p:spPr>
-          <a:xfrm>
-            <a:off x="729450" y="1318650"/>
-            <a:ext cx="7688700" cy="535200"/>
-          </a:xfrm>
-          <a:prstGeom prst="rect">
-            <a:avLst/>
-          </a:prstGeom>
-        </p:spPr>
-        <p:txBody>
-          <a:bodyPr anchorCtr="0" anchor="t" bIns="91425" lIns="91425" spcFirstLastPara="1" rIns="91425" wrap="square" tIns="91425">
-            <a:normAutofit fontScale="90000"/>
-          </a:bodyPr>
-          <a:lstStyle/>
-          <a:p>
-            <a:pPr indent="0" lvl="0" marL="0" rtl="0" algn="l">
-              <a:spcBef>
-                <a:spcPts val="0"/>
-              </a:spcBef>
-              <a:spcAft>
-                <a:spcPts val="0"/>
-              </a:spcAft>
-              <a:buNone/>
-            </a:pPr>
-            <a:r>
-              <a:rPr lang="en"/>
-              <a:t>Poster </a:t>
-            </a:r>
-            <a:endParaRPr/>
-          </a:p>
-        </p:txBody>
-      </p:sp>
-      <p:pic>
-        <p:nvPicPr>
-          <p:cNvPr id="194" name="Google Shape;194;p27"/>
-          <p:cNvPicPr preferRelativeResize="0"/>
-          <p:nvPr/>
-        </p:nvPicPr>
-        <p:blipFill rotWithShape="1">
-          <a:blip r:embed="rId3">
-            <a:alphaModFix/>
-          </a:blip>
-          <a:srcRect b="0" l="0" r="0" t="0"/>
-          <a:stretch/>
-        </p:blipFill>
-        <p:spPr>
-          <a:xfrm>
-            <a:off x="2644965" y="-12"/>
-            <a:ext cx="3857672" cy="5143501"/>
-          </a:xfrm>
-          <a:prstGeom prst="rect">
-            <a:avLst/>
-          </a:prstGeom>
-          <a:noFill/>
-          <a:ln>
-            <a:noFill/>
-          </a:ln>
-        </p:spPr>
-      </p:pic>
-    </p:spTree>
-  </p:cSld>
-  <p:clrMapOvr>
-    <a:masterClrMapping/>
-  </p:clrMapOvr>
-</p:sld>
-</file>
-
-<file path=ppt/slides/slide16.xml><?xml version="1.0" encoding="utf-8"?>
-<p:sld xmlns:a="http://schemas.openxmlformats.org/drawingml/2006/main" xmlns:r="http://schemas.openxmlformats.org/officeDocument/2006/relationships" xmlns:mc="http://schemas.openxmlformats.org/markup-compatibility/2006" xmlns:mv="urn:schemas-microsoft-com:mac:vml" xmlns:p="http://schemas.openxmlformats.org/presentationml/2006/main" xmlns:c="http://schemas.openxmlformats.org/drawingml/2006/chart" xmlns:dgm="http://schemas.openxmlformats.org/drawingml/2006/diagram" xmlns:o="urn:schemas-microsoft-com:office:office" xmlns:v="urn:schemas-microsoft-com:vml" xmlns:pvml="urn:schemas-microsoft-com:office:powerpoint" xmlns:com="http://schemas.openxmlformats.org/drawingml/2006/compatibility" xmlns:p14="http://schemas.microsoft.com/office/powerpoint/2010/main" xmlns:p15="http://schemas.microsoft.com/office/powerpoint/2012/main" xmlns:ahyp="http://schemas.microsoft.com/office/drawing/2018/hyperlinkcolor">
-  <p:cSld>
-    <p:spTree>
-      <p:nvGrpSpPr>
-        <p:cNvPr id="198" name="Shape 198"/>
-        <p:cNvGrpSpPr/>
-        <p:nvPr/>
-      </p:nvGrpSpPr>
-      <p:grpSpPr>
-        <a:xfrm>
-          <a:off x="0" y="0"/>
-          <a:ext cx="0" cy="0"/>
-          <a:chOff x="0" y="0"/>
-          <a:chExt cx="0" cy="0"/>
-        </a:xfrm>
-      </p:grpSpPr>
-      <p:pic>
-        <p:nvPicPr>
-          <p:cNvPr id="199" name="Google Shape;199;p28"/>
+          <p:cNvPr id="176" name="Google Shape;176;p25"/>
           <p:cNvPicPr preferRelativeResize="0"/>
           <p:nvPr/>
         </p:nvPicPr>
@@ -9890,8 +9081,8 @@
         </p:nvSpPr>
         <p:spPr>
           <a:xfrm>
-            <a:off x="2811788" y="1306250"/>
-            <a:ext cx="3256500" cy="535200"/>
+            <a:off x="729450" y="1318650"/>
+            <a:ext cx="7688700" cy="535200"/>
           </a:xfrm>
           <a:prstGeom prst="rect">
             <a:avLst/>
@@ -9903,7 +9094,7 @@
           </a:bodyPr>
           <a:lstStyle/>
           <a:p>
-            <a:pPr indent="0" lvl="0" marL="0" rtl="0" algn="ctr">
+            <a:pPr indent="0" lvl="0" marL="0" rtl="0" algn="l">
               <a:spcBef>
                 <a:spcPts val="0"/>
               </a:spcBef>
@@ -9914,264 +9105,104 @@
             </a:pPr>
             <a:r>
               <a:rPr lang="en"/>
-              <a:t>Technologies</a:t>
+              <a:t> Brief Abstract </a:t>
             </a:r>
             <a:endParaRPr/>
           </a:p>
         </p:txBody>
       </p:sp>
-      <p:pic>
-        <p:nvPicPr>
+      <p:sp>
+        <p:nvSpPr>
           <p:cNvPr id="99" name="Google Shape;99;p15"/>
-          <p:cNvPicPr preferRelativeResize="0"/>
-          <p:nvPr/>
-        </p:nvPicPr>
-        <p:blipFill>
-          <a:blip r:embed="rId3">
-            <a:alphaModFix/>
-          </a:blip>
-          <a:stretch>
-            <a:fillRect/>
-          </a:stretch>
-        </p:blipFill>
+          <p:cNvSpPr txBox="1"/>
+          <p:nvPr>
+            <p:ph idx="1" type="body"/>
+          </p:nvPr>
+        </p:nvSpPr>
         <p:spPr>
           <a:xfrm>
-            <a:off x="6548900" y="2013637"/>
-            <a:ext cx="2541150" cy="850177"/>
+            <a:off x="729450" y="2078875"/>
+            <a:ext cx="7688700" cy="2261100"/>
           </a:xfrm>
           <a:prstGeom prst="rect">
             <a:avLst/>
           </a:prstGeom>
-          <a:noFill/>
-          <a:ln>
-            <a:noFill/>
-          </a:ln>
         </p:spPr>
-      </p:pic>
-      <p:pic>
-        <p:nvPicPr>
-          <p:cNvPr id="100" name="Google Shape;100;p15"/>
-          <p:cNvPicPr preferRelativeResize="0"/>
-          <p:nvPr/>
-        </p:nvPicPr>
-        <p:blipFill>
-          <a:blip r:embed="rId4">
-            <a:alphaModFix/>
-          </a:blip>
-          <a:stretch>
-            <a:fillRect/>
-          </a:stretch>
-        </p:blipFill>
-        <p:spPr>
-          <a:xfrm>
-            <a:off x="4702611" y="3241116"/>
-            <a:ext cx="1532550" cy="1776491"/>
-          </a:xfrm>
-          <a:prstGeom prst="rect">
-            <a:avLst/>
-          </a:prstGeom>
-          <a:noFill/>
-          <a:ln>
-            <a:noFill/>
-          </a:ln>
-        </p:spPr>
-      </p:pic>
-      <p:pic>
-        <p:nvPicPr>
-          <p:cNvPr id="101" name="Google Shape;101;p15"/>
-          <p:cNvPicPr preferRelativeResize="0"/>
-          <p:nvPr/>
-        </p:nvPicPr>
-        <p:blipFill>
-          <a:blip r:embed="rId5">
-            <a:alphaModFix/>
-          </a:blip>
-          <a:stretch>
-            <a:fillRect/>
-          </a:stretch>
-        </p:blipFill>
-        <p:spPr>
-          <a:xfrm>
-            <a:off x="2129426" y="1981100"/>
-            <a:ext cx="1758725" cy="989274"/>
-          </a:xfrm>
-          <a:prstGeom prst="rect">
-            <a:avLst/>
-          </a:prstGeom>
-          <a:noFill/>
-          <a:ln>
-            <a:noFill/>
-          </a:ln>
-        </p:spPr>
-      </p:pic>
-      <p:pic>
-        <p:nvPicPr>
-          <p:cNvPr id="102" name="Google Shape;102;p15"/>
-          <p:cNvPicPr preferRelativeResize="0"/>
-          <p:nvPr/>
-        </p:nvPicPr>
-        <p:blipFill>
-          <a:blip r:embed="rId6">
-            <a:alphaModFix/>
-          </a:blip>
-          <a:stretch>
-            <a:fillRect/>
-          </a:stretch>
-        </p:blipFill>
-        <p:spPr>
-          <a:xfrm>
-            <a:off x="320700" y="2157450"/>
-            <a:ext cx="1304837" cy="535200"/>
-          </a:xfrm>
-          <a:prstGeom prst="rect">
-            <a:avLst/>
-          </a:prstGeom>
-          <a:noFill/>
-          <a:ln>
-            <a:noFill/>
-          </a:ln>
-        </p:spPr>
-      </p:pic>
-      <p:pic>
-        <p:nvPicPr>
-          <p:cNvPr id="103" name="Google Shape;103;p15"/>
-          <p:cNvPicPr preferRelativeResize="0"/>
-          <p:nvPr/>
-        </p:nvPicPr>
-        <p:blipFill>
-          <a:blip r:embed="rId7">
-            <a:alphaModFix/>
-          </a:blip>
-          <a:stretch>
-            <a:fillRect/>
-          </a:stretch>
-        </p:blipFill>
-        <p:spPr>
-          <a:xfrm>
-            <a:off x="2761122" y="3672616"/>
-            <a:ext cx="894000" cy="913483"/>
-          </a:xfrm>
-          <a:prstGeom prst="rect">
-            <a:avLst/>
-          </a:prstGeom>
-          <a:noFill/>
-          <a:ln>
-            <a:noFill/>
-          </a:ln>
-        </p:spPr>
-      </p:pic>
-      <p:pic>
-        <p:nvPicPr>
-          <p:cNvPr id="104" name="Google Shape;104;p15"/>
-          <p:cNvPicPr preferRelativeResize="0"/>
-          <p:nvPr/>
-        </p:nvPicPr>
-        <p:blipFill>
-          <a:blip r:embed="rId8">
-            <a:alphaModFix/>
-          </a:blip>
-          <a:stretch>
-            <a:fillRect/>
-          </a:stretch>
-        </p:blipFill>
-        <p:spPr>
-          <a:xfrm>
-            <a:off x="4392050" y="2013625"/>
-            <a:ext cx="1922784" cy="1001450"/>
-          </a:xfrm>
-          <a:prstGeom prst="rect">
-            <a:avLst/>
-          </a:prstGeom>
-          <a:noFill/>
-          <a:ln>
-            <a:noFill/>
-          </a:ln>
-        </p:spPr>
-      </p:pic>
-      <p:pic>
-        <p:nvPicPr>
-          <p:cNvPr id="105" name="Google Shape;105;p15"/>
-          <p:cNvPicPr preferRelativeResize="0"/>
-          <p:nvPr/>
-        </p:nvPicPr>
-        <p:blipFill>
-          <a:blip r:embed="rId9">
-            <a:alphaModFix/>
-          </a:blip>
-          <a:stretch>
-            <a:fillRect/>
-          </a:stretch>
-        </p:blipFill>
-        <p:spPr>
-          <a:xfrm>
-            <a:off x="7101913" y="3030142"/>
-            <a:ext cx="1435126" cy="807264"/>
-          </a:xfrm>
-          <a:prstGeom prst="rect">
-            <a:avLst/>
-          </a:prstGeom>
-          <a:noFill/>
-          <a:ln>
-            <a:noFill/>
-          </a:ln>
-        </p:spPr>
-      </p:pic>
-      <p:pic>
-        <p:nvPicPr>
-          <p:cNvPr id="106" name="Google Shape;106;p15"/>
-          <p:cNvPicPr preferRelativeResize="0"/>
-          <p:nvPr/>
-        </p:nvPicPr>
-        <p:blipFill>
-          <a:blip r:embed="rId10">
-            <a:alphaModFix/>
-          </a:blip>
-          <a:stretch>
-            <a:fillRect/>
-          </a:stretch>
-        </p:blipFill>
-        <p:spPr>
-          <a:xfrm>
-            <a:off x="7246170" y="4003735"/>
-            <a:ext cx="1146609" cy="913475"/>
-          </a:xfrm>
-          <a:prstGeom prst="rect">
-            <a:avLst/>
-          </a:prstGeom>
-          <a:noFill/>
-          <a:ln>
-            <a:noFill/>
-          </a:ln>
-        </p:spPr>
-      </p:pic>
-      <p:pic>
-        <p:nvPicPr>
-          <p:cNvPr id="107" name="Google Shape;107;p15"/>
-          <p:cNvPicPr preferRelativeResize="0"/>
-          <p:nvPr/>
-        </p:nvPicPr>
-        <p:blipFill>
-          <a:blip r:embed="rId11">
-            <a:alphaModFix/>
-          </a:blip>
-          <a:stretch>
-            <a:fillRect/>
-          </a:stretch>
-        </p:blipFill>
-        <p:spPr>
-          <a:xfrm>
-            <a:off x="409124" y="3431525"/>
-            <a:ext cx="1435125" cy="1244575"/>
-          </a:xfrm>
-          <a:prstGeom prst="rect">
-            <a:avLst/>
-          </a:prstGeom>
-          <a:noFill/>
-          <a:ln>
-            <a:noFill/>
-          </a:ln>
-        </p:spPr>
-      </p:pic>
+        <p:txBody>
+          <a:bodyPr anchorCtr="0" anchor="t" bIns="91425" lIns="91425" spcFirstLastPara="1" rIns="91425" wrap="square" tIns="91425">
+            <a:normAutofit fontScale="32500"/>
+          </a:bodyPr>
+          <a:lstStyle/>
+          <a:p>
+            <a:pPr indent="0" lvl="0" marL="0" rtl="0" algn="l">
+              <a:spcBef>
+                <a:spcPts val="0"/>
+              </a:spcBef>
+              <a:spcAft>
+                <a:spcPts val="0"/>
+              </a:spcAft>
+              <a:buNone/>
+            </a:pPr>
+            <a:r>
+              <a:rPr lang="en" sz="5200">
+                <a:solidFill>
+                  <a:srgbClr val="24292F"/>
+                </a:solidFill>
+                <a:highlight>
+                  <a:srgbClr val="FFFFFF"/>
+                </a:highlight>
+              </a:rPr>
+              <a:t>Our goal was to find trends that will allow us to find PFAS/Teflon in US and GA. The reasons being that it can cause serious health issues if entering a person's blood system. Since the chemical never fully goes  away, it stays once anyone is exposed to it. So we want to be able indicate/reveal PFAS at any site to prevent harm and find the offenders causing it.</a:t>
+            </a:r>
+            <a:endParaRPr sz="5200">
+              <a:solidFill>
+                <a:srgbClr val="24292F"/>
+              </a:solidFill>
+              <a:highlight>
+                <a:srgbClr val="FFFFFF"/>
+              </a:highlight>
+            </a:endParaRPr>
+          </a:p>
+          <a:p>
+            <a:pPr indent="0" lvl="0" marL="0" rtl="0" algn="l">
+              <a:spcBef>
+                <a:spcPts val="1200"/>
+              </a:spcBef>
+              <a:spcAft>
+                <a:spcPts val="0"/>
+              </a:spcAft>
+              <a:buNone/>
+            </a:pPr>
+            <a:r>
+              <a:t/>
+            </a:r>
+            <a:endParaRPr sz="1100">
+              <a:solidFill>
+                <a:srgbClr val="000000"/>
+              </a:solidFill>
+              <a:latin typeface="Arial"/>
+              <a:ea typeface="Arial"/>
+              <a:cs typeface="Arial"/>
+              <a:sym typeface="Arial"/>
+            </a:endParaRPr>
+          </a:p>
+          <a:p>
+            <a:pPr indent="0" lvl="0" marL="0" rtl="0" algn="l">
+              <a:spcBef>
+                <a:spcPts val="0"/>
+              </a:spcBef>
+              <a:spcAft>
+                <a:spcPts val="1200"/>
+              </a:spcAft>
+              <a:buNone/>
+            </a:pPr>
+            <a:r>
+              <a:t/>
+            </a:r>
+            <a:endParaRPr/>
+          </a:p>
+        </p:txBody>
+      </p:sp>
     </p:spTree>
   </p:cSld>
   <p:clrMapOvr>
@@ -10185,7 +9216,7 @@
   <p:cSld>
     <p:spTree>
       <p:nvGrpSpPr>
-        <p:cNvPr id="111" name="Shape 111"/>
+        <p:cNvPr id="103" name="Shape 103"/>
         <p:cNvGrpSpPr/>
         <p:nvPr/>
       </p:nvGrpSpPr>
@@ -10199,7 +9230,7 @@
       </p:grpSpPr>
       <p:sp>
         <p:nvSpPr>
-          <p:cNvPr id="112" name="Google Shape;112;p16"/>
+          <p:cNvPr id="104" name="Google Shape;104;p16"/>
           <p:cNvSpPr txBox="1"/>
           <p:nvPr>
             <p:ph type="title"/>
@@ -10207,8 +9238,8 @@
         </p:nvSpPr>
         <p:spPr>
           <a:xfrm>
-            <a:off x="729450" y="1318650"/>
-            <a:ext cx="7688700" cy="535200"/>
+            <a:off x="2811788" y="1306250"/>
+            <a:ext cx="3256500" cy="535200"/>
           </a:xfrm>
           <a:prstGeom prst="rect">
             <a:avLst/>
@@ -10220,7 +9251,7 @@
           </a:bodyPr>
           <a:lstStyle/>
           <a:p>
-            <a:pPr indent="0" lvl="0" marL="0" rtl="0" algn="l">
+            <a:pPr indent="0" lvl="0" marL="0" rtl="0" algn="ctr">
               <a:spcBef>
                 <a:spcPts val="0"/>
               </a:spcBef>
@@ -10231,62 +9262,7 @@
             </a:pPr>
             <a:r>
               <a:rPr lang="en"/>
-              <a:t>Github repo</a:t>
-            </a:r>
-            <a:endParaRPr/>
-          </a:p>
-          <a:p>
-            <a:pPr indent="0" lvl="0" marL="0" rtl="0" algn="l">
-              <a:spcBef>
-                <a:spcPts val="0"/>
-              </a:spcBef>
-              <a:spcAft>
-                <a:spcPts val="0"/>
-              </a:spcAft>
-              <a:buNone/>
-            </a:pPr>
-            <a:r>
-              <a:t/>
-            </a:r>
-            <a:endParaRPr/>
-          </a:p>
-        </p:txBody>
-      </p:sp>
-      <p:sp>
-        <p:nvSpPr>
-          <p:cNvPr id="113" name="Google Shape;113;p16"/>
-          <p:cNvSpPr txBox="1"/>
-          <p:nvPr>
-            <p:ph idx="1" type="body"/>
-          </p:nvPr>
-        </p:nvSpPr>
-        <p:spPr>
-          <a:xfrm>
-            <a:off x="729450" y="2078875"/>
-            <a:ext cx="3123000" cy="2261100"/>
-          </a:xfrm>
-          <a:prstGeom prst="rect">
-            <a:avLst/>
-          </a:prstGeom>
-        </p:spPr>
-        <p:txBody>
-          <a:bodyPr anchorCtr="0" anchor="t" bIns="91425" lIns="91425" spcFirstLastPara="1" rIns="91425" wrap="square" tIns="91425">
-            <a:normAutofit/>
-          </a:bodyPr>
-          <a:lstStyle/>
-          <a:p>
-            <a:pPr indent="0" lvl="0" marL="0" rtl="0" algn="l">
-              <a:spcBef>
-                <a:spcPts val="0"/>
-              </a:spcBef>
-              <a:spcAft>
-                <a:spcPts val="1200"/>
-              </a:spcAft>
-              <a:buNone/>
-            </a:pPr>
-            <a:r>
-              <a:rPr lang="en"/>
-              <a:t>Our updated Github, with all of information,  link to website, documents, our notebooks and our datasets. The readme goes into more depth of our project and our purpose, our teams and some of the technologies we used.</a:t>
+              <a:t>Technologies</a:t>
             </a:r>
             <a:endParaRPr/>
           </a:p>
@@ -10294,7 +9270,7 @@
       </p:sp>
       <p:pic>
         <p:nvPicPr>
-          <p:cNvPr id="114" name="Google Shape;114;p16"/>
+          <p:cNvPr id="105" name="Google Shape;105;p16"/>
           <p:cNvPicPr preferRelativeResize="0"/>
           <p:nvPr/>
         </p:nvPicPr>
@@ -10308,8 +9284,8 @@
         </p:blipFill>
         <p:spPr>
           <a:xfrm>
-            <a:off x="4905688" y="943000"/>
-            <a:ext cx="3557374" cy="1135875"/>
+            <a:off x="6548900" y="2013637"/>
+            <a:ext cx="2541150" cy="850177"/>
           </a:xfrm>
           <a:prstGeom prst="rect">
             <a:avLst/>
@@ -10322,7 +9298,7 @@
       </p:pic>
       <p:pic>
         <p:nvPicPr>
-          <p:cNvPr id="115" name="Google Shape;115;p16"/>
+          <p:cNvPr id="106" name="Google Shape;106;p16"/>
           <p:cNvPicPr preferRelativeResize="0"/>
           <p:nvPr/>
         </p:nvPicPr>
@@ -10336,8 +9312,176 @@
         </p:blipFill>
         <p:spPr>
           <a:xfrm>
-            <a:off x="4950600" y="2179200"/>
-            <a:ext cx="3467549" cy="2759823"/>
+            <a:off x="4702611" y="3241116"/>
+            <a:ext cx="1532550" cy="1776491"/>
+          </a:xfrm>
+          <a:prstGeom prst="rect">
+            <a:avLst/>
+          </a:prstGeom>
+          <a:noFill/>
+          <a:ln>
+            <a:noFill/>
+          </a:ln>
+        </p:spPr>
+      </p:pic>
+      <p:pic>
+        <p:nvPicPr>
+          <p:cNvPr id="107" name="Google Shape;107;p16"/>
+          <p:cNvPicPr preferRelativeResize="0"/>
+          <p:nvPr/>
+        </p:nvPicPr>
+        <p:blipFill>
+          <a:blip r:embed="rId5">
+            <a:alphaModFix/>
+          </a:blip>
+          <a:stretch>
+            <a:fillRect/>
+          </a:stretch>
+        </p:blipFill>
+        <p:spPr>
+          <a:xfrm>
+            <a:off x="2129426" y="1981100"/>
+            <a:ext cx="1758725" cy="989274"/>
+          </a:xfrm>
+          <a:prstGeom prst="rect">
+            <a:avLst/>
+          </a:prstGeom>
+          <a:noFill/>
+          <a:ln>
+            <a:noFill/>
+          </a:ln>
+        </p:spPr>
+      </p:pic>
+      <p:pic>
+        <p:nvPicPr>
+          <p:cNvPr id="108" name="Google Shape;108;p16"/>
+          <p:cNvPicPr preferRelativeResize="0"/>
+          <p:nvPr/>
+        </p:nvPicPr>
+        <p:blipFill>
+          <a:blip r:embed="rId6">
+            <a:alphaModFix/>
+          </a:blip>
+          <a:stretch>
+            <a:fillRect/>
+          </a:stretch>
+        </p:blipFill>
+        <p:spPr>
+          <a:xfrm>
+            <a:off x="320700" y="2157450"/>
+            <a:ext cx="1304837" cy="535200"/>
+          </a:xfrm>
+          <a:prstGeom prst="rect">
+            <a:avLst/>
+          </a:prstGeom>
+          <a:noFill/>
+          <a:ln>
+            <a:noFill/>
+          </a:ln>
+        </p:spPr>
+      </p:pic>
+      <p:pic>
+        <p:nvPicPr>
+          <p:cNvPr id="109" name="Google Shape;109;p16"/>
+          <p:cNvPicPr preferRelativeResize="0"/>
+          <p:nvPr/>
+        </p:nvPicPr>
+        <p:blipFill>
+          <a:blip r:embed="rId7">
+            <a:alphaModFix/>
+          </a:blip>
+          <a:stretch>
+            <a:fillRect/>
+          </a:stretch>
+        </p:blipFill>
+        <p:spPr>
+          <a:xfrm>
+            <a:off x="2761122" y="3672616"/>
+            <a:ext cx="894000" cy="913483"/>
+          </a:xfrm>
+          <a:prstGeom prst="rect">
+            <a:avLst/>
+          </a:prstGeom>
+          <a:noFill/>
+          <a:ln>
+            <a:noFill/>
+          </a:ln>
+        </p:spPr>
+      </p:pic>
+      <p:pic>
+        <p:nvPicPr>
+          <p:cNvPr id="110" name="Google Shape;110;p16"/>
+          <p:cNvPicPr preferRelativeResize="0"/>
+          <p:nvPr/>
+        </p:nvPicPr>
+        <p:blipFill>
+          <a:blip r:embed="rId8">
+            <a:alphaModFix/>
+          </a:blip>
+          <a:stretch>
+            <a:fillRect/>
+          </a:stretch>
+        </p:blipFill>
+        <p:spPr>
+          <a:xfrm>
+            <a:off x="4751300" y="2021417"/>
+            <a:ext cx="1435126" cy="807264"/>
+          </a:xfrm>
+          <a:prstGeom prst="rect">
+            <a:avLst/>
+          </a:prstGeom>
+          <a:noFill/>
+          <a:ln>
+            <a:noFill/>
+          </a:ln>
+        </p:spPr>
+      </p:pic>
+      <p:pic>
+        <p:nvPicPr>
+          <p:cNvPr id="111" name="Google Shape;111;p16"/>
+          <p:cNvPicPr preferRelativeResize="0"/>
+          <p:nvPr/>
+        </p:nvPicPr>
+        <p:blipFill>
+          <a:blip r:embed="rId9">
+            <a:alphaModFix/>
+          </a:blip>
+          <a:stretch>
+            <a:fillRect/>
+          </a:stretch>
+        </p:blipFill>
+        <p:spPr>
+          <a:xfrm>
+            <a:off x="7246170" y="3431535"/>
+            <a:ext cx="1146609" cy="913475"/>
+          </a:xfrm>
+          <a:prstGeom prst="rect">
+            <a:avLst/>
+          </a:prstGeom>
+          <a:noFill/>
+          <a:ln>
+            <a:noFill/>
+          </a:ln>
+        </p:spPr>
+      </p:pic>
+      <p:pic>
+        <p:nvPicPr>
+          <p:cNvPr id="112" name="Google Shape;112;p16"/>
+          <p:cNvPicPr preferRelativeResize="0"/>
+          <p:nvPr/>
+        </p:nvPicPr>
+        <p:blipFill>
+          <a:blip r:embed="rId10">
+            <a:alphaModFix/>
+          </a:blip>
+          <a:stretch>
+            <a:fillRect/>
+          </a:stretch>
+        </p:blipFill>
+        <p:spPr>
+          <a:xfrm>
+            <a:off x="409124" y="3431525"/>
+            <a:ext cx="1435125" cy="1244575"/>
           </a:xfrm>
           <a:prstGeom prst="rect">
             <a:avLst/>
@@ -10361,7 +9505,7 @@
   <p:cSld>
     <p:spTree>
       <p:nvGrpSpPr>
-        <p:cNvPr id="119" name="Shape 119"/>
+        <p:cNvPr id="116" name="Shape 116"/>
         <p:cNvGrpSpPr/>
         <p:nvPr/>
       </p:nvGrpSpPr>
@@ -10375,7 +9519,7 @@
       </p:grpSpPr>
       <p:sp>
         <p:nvSpPr>
-          <p:cNvPr id="120" name="Google Shape;120;p17"/>
+          <p:cNvPr id="117" name="Google Shape;117;p17"/>
           <p:cNvSpPr txBox="1"/>
           <p:nvPr>
             <p:ph type="title"/>
@@ -10407,47 +9551,22 @@
             </a:pPr>
             <a:r>
               <a:rPr lang="en"/>
-              <a:t>Jira</a:t>
+              <a:t>Is there a is an indicator that can be used in finding PFAS in the water?</a:t>
             </a:r>
             <a:endParaRPr/>
           </a:p>
-        </p:txBody>
-      </p:sp>
-      <p:sp>
-        <p:nvSpPr>
-          <p:cNvPr id="121" name="Google Shape;121;p17"/>
-          <p:cNvSpPr txBox="1"/>
-          <p:nvPr>
-            <p:ph idx="1" type="body"/>
-          </p:nvPr>
-        </p:nvSpPr>
-        <p:spPr>
-          <a:xfrm>
-            <a:off x="729450" y="2078875"/>
-            <a:ext cx="3353100" cy="2261100"/>
-          </a:xfrm>
-          <a:prstGeom prst="rect">
-            <a:avLst/>
-          </a:prstGeom>
-        </p:spPr>
-        <p:txBody>
-          <a:bodyPr anchorCtr="0" anchor="t" bIns="91425" lIns="91425" spcFirstLastPara="1" rIns="91425" wrap="square" tIns="91425">
-            <a:normAutofit/>
-          </a:bodyPr>
-          <a:lstStyle/>
           <a:p>
             <a:pPr indent="0" lvl="0" marL="0" rtl="0" algn="l">
               <a:spcBef>
                 <a:spcPts val="0"/>
               </a:spcBef>
               <a:spcAft>
-                <a:spcPts val="1200"/>
+                <a:spcPts val="0"/>
               </a:spcAft>
               <a:buNone/>
             </a:pPr>
             <a:r>
-              <a:rPr lang="en"/>
-              <a:t>This is our progress shown in Jira, we have nearly completed all remaining tasks left. After the CREATE all that would be left is the client meeting.</a:t>
+              <a:t/>
             </a:r>
             <a:endParaRPr/>
           </a:p>
@@ -10455,7 +9574,7 @@
       </p:sp>
       <p:pic>
         <p:nvPicPr>
-          <p:cNvPr id="122" name="Google Shape;122;p17"/>
+          <p:cNvPr id="118" name="Google Shape;118;p17"/>
           <p:cNvPicPr preferRelativeResize="0"/>
           <p:nvPr/>
         </p:nvPicPr>
@@ -10469,8 +9588,8 @@
         </p:blipFill>
         <p:spPr>
           <a:xfrm>
-            <a:off x="4266200" y="1954175"/>
-            <a:ext cx="4756649" cy="2123504"/>
+            <a:off x="6345675" y="2342225"/>
+            <a:ext cx="2798325" cy="2039275"/>
           </a:xfrm>
           <a:prstGeom prst="rect">
             <a:avLst/>
@@ -10481,6 +9600,122 @@
           </a:ln>
         </p:spPr>
       </p:pic>
+      <p:pic>
+        <p:nvPicPr>
+          <p:cNvPr id="119" name="Google Shape;119;p17"/>
+          <p:cNvPicPr preferRelativeResize="0"/>
+          <p:nvPr/>
+        </p:nvPicPr>
+        <p:blipFill rotWithShape="1">
+          <a:blip r:embed="rId4">
+            <a:alphaModFix/>
+          </a:blip>
+          <a:srcRect b="17603" l="17507" r="22900" t="29547"/>
+          <a:stretch/>
+        </p:blipFill>
+        <p:spPr>
+          <a:xfrm>
+            <a:off x="2865200" y="2367988"/>
+            <a:ext cx="3413601" cy="1835350"/>
+          </a:xfrm>
+          <a:prstGeom prst="rect">
+            <a:avLst/>
+          </a:prstGeom>
+          <a:noFill/>
+          <a:ln>
+            <a:noFill/>
+          </a:ln>
+        </p:spPr>
+      </p:pic>
+      <p:pic>
+        <p:nvPicPr>
+          <p:cNvPr id="120" name="Google Shape;120;p17"/>
+          <p:cNvPicPr preferRelativeResize="0"/>
+          <p:nvPr/>
+        </p:nvPicPr>
+        <p:blipFill>
+          <a:blip r:embed="rId5">
+            <a:alphaModFix/>
+          </a:blip>
+          <a:stretch>
+            <a:fillRect/>
+          </a:stretch>
+        </p:blipFill>
+        <p:spPr>
+          <a:xfrm>
+            <a:off x="0" y="2266025"/>
+            <a:ext cx="2798328" cy="2039275"/>
+          </a:xfrm>
+          <a:prstGeom prst="rect">
+            <a:avLst/>
+          </a:prstGeom>
+          <a:noFill/>
+          <a:ln>
+            <a:noFill/>
+          </a:ln>
+        </p:spPr>
+      </p:pic>
+      <p:sp>
+        <p:nvSpPr>
+          <p:cNvPr id="121" name="Google Shape;121;p17"/>
+          <p:cNvSpPr txBox="1"/>
+          <p:nvPr/>
+        </p:nvSpPr>
+        <p:spPr>
+          <a:xfrm>
+            <a:off x="729450" y="4540850"/>
+            <a:ext cx="7332600" cy="400200"/>
+          </a:xfrm>
+          <a:prstGeom prst="rect">
+            <a:avLst/>
+          </a:prstGeom>
+          <a:noFill/>
+          <a:ln>
+            <a:noFill/>
+          </a:ln>
+        </p:spPr>
+        <p:txBody>
+          <a:bodyPr anchorCtr="0" anchor="t" bIns="91425" lIns="91425" spcFirstLastPara="1" rIns="91425" wrap="square" tIns="91425">
+            <a:spAutoFit/>
+          </a:bodyPr>
+          <a:lstStyle/>
+          <a:p>
+            <a:pPr indent="0" lvl="0" marL="0" rtl="0" algn="l">
+              <a:spcBef>
+                <a:spcPts val="0"/>
+              </a:spcBef>
+              <a:spcAft>
+                <a:spcPts val="0"/>
+              </a:spcAft>
+              <a:buNone/>
+            </a:pPr>
+            <a:r>
+              <a:rPr lang="en">
+                <a:latin typeface="Lato"/>
+                <a:ea typeface="Lato"/>
+                <a:cs typeface="Lato"/>
+                <a:sym typeface="Lato"/>
+              </a:rPr>
+              <a:t>Chlorate, Vanadium, Chromium-6 are indicators of </a:t>
+            </a:r>
+            <a:r>
+              <a:rPr lang="en">
+                <a:latin typeface="Lato"/>
+                <a:ea typeface="Lato"/>
+                <a:cs typeface="Lato"/>
+                <a:sym typeface="Lato"/>
+              </a:rPr>
+              <a:t>PFOA which is a by product of Teflon</a:t>
+            </a:r>
+            <a:endParaRPr>
+              <a:latin typeface="Lato"/>
+              <a:ea typeface="Lato"/>
+              <a:cs typeface="Lato"/>
+              <a:sym typeface="Lato"/>
+            </a:endParaRPr>
+          </a:p>
+        </p:txBody>
+      </p:sp>
     </p:spTree>
   </p:cSld>
   <p:clrMapOvr>
@@ -10494,7 +9729,7 @@
   <p:cSld>
     <p:spTree>
       <p:nvGrpSpPr>
-        <p:cNvPr id="126" name="Shape 126"/>
+        <p:cNvPr id="125" name="Shape 125"/>
         <p:cNvGrpSpPr/>
         <p:nvPr/>
       </p:nvGrpSpPr>
@@ -10508,7 +9743,7 @@
       </p:grpSpPr>
       <p:sp>
         <p:nvSpPr>
-          <p:cNvPr id="127" name="Google Shape;127;p18"/>
+          <p:cNvPr id="126" name="Google Shape;126;p18"/>
           <p:cNvSpPr txBox="1"/>
           <p:nvPr>
             <p:ph type="title"/>
@@ -10517,7 +9752,7 @@
         <p:spPr>
           <a:xfrm>
             <a:off x="729450" y="1318650"/>
-            <a:ext cx="7688700" cy="535200"/>
+            <a:ext cx="8085900" cy="535200"/>
           </a:xfrm>
           <a:prstGeom prst="rect">
             <a:avLst/>
@@ -10540,47 +9775,7 @@
             </a:pPr>
             <a:r>
               <a:rPr lang="en"/>
-              <a:t>FlowChart </a:t>
-            </a:r>
-            <a:endParaRPr/>
-          </a:p>
-        </p:txBody>
-      </p:sp>
-      <p:sp>
-        <p:nvSpPr>
-          <p:cNvPr id="128" name="Google Shape;128;p18"/>
-          <p:cNvSpPr txBox="1"/>
-          <p:nvPr>
-            <p:ph idx="1" type="body"/>
-          </p:nvPr>
-        </p:nvSpPr>
-        <p:spPr>
-          <a:xfrm>
-            <a:off x="729450" y="2078875"/>
-            <a:ext cx="2914800" cy="2261100"/>
-          </a:xfrm>
-          <a:prstGeom prst="rect">
-            <a:avLst/>
-          </a:prstGeom>
-        </p:spPr>
-        <p:txBody>
-          <a:bodyPr anchorCtr="0" anchor="t" bIns="91425" lIns="91425" spcFirstLastPara="1" rIns="91425" wrap="square" tIns="91425">
-            <a:normAutofit/>
-          </a:bodyPr>
-          <a:lstStyle/>
-          <a:p>
-            <a:pPr indent="0" lvl="0" marL="0" rtl="0" algn="l">
-              <a:spcBef>
-                <a:spcPts val="0"/>
-              </a:spcBef>
-              <a:spcAft>
-                <a:spcPts val="1200"/>
-              </a:spcAft>
-              <a:buNone/>
-            </a:pPr>
-            <a:r>
-              <a:rPr lang="en"/>
-              <a:t>The final flowchart that shows where we are at currently. We are at CREATE and using all the remaining time to work on tasks needed for CREATE and after.</a:t>
+              <a:t>Are people getting more exposed to PFAS?</a:t>
             </a:r>
             <a:endParaRPr/>
           </a:p>
@@ -10588,7 +9783,7 @@
       </p:sp>
       <p:pic>
         <p:nvPicPr>
-          <p:cNvPr id="129" name="Google Shape;129;p18"/>
+          <p:cNvPr id="127" name="Google Shape;127;p18"/>
           <p:cNvPicPr preferRelativeResize="0"/>
           <p:nvPr/>
         </p:nvPicPr>
@@ -10602,8 +9797,8 @@
         </p:blipFill>
         <p:spPr>
           <a:xfrm>
-            <a:off x="5258050" y="1431025"/>
-            <a:ext cx="2437700" cy="3278950"/>
+            <a:off x="3027225" y="2012075"/>
+            <a:ext cx="3089550" cy="2163900"/>
           </a:xfrm>
           <a:prstGeom prst="rect">
             <a:avLst/>
@@ -10614,6 +9809,58 @@
           </a:ln>
         </p:spPr>
       </p:pic>
+      <p:sp>
+        <p:nvSpPr>
+          <p:cNvPr id="128" name="Google Shape;128;p18"/>
+          <p:cNvSpPr txBox="1"/>
+          <p:nvPr/>
+        </p:nvSpPr>
+        <p:spPr>
+          <a:xfrm>
+            <a:off x="729450" y="4428750"/>
+            <a:ext cx="7332600" cy="400200"/>
+          </a:xfrm>
+          <a:prstGeom prst="rect">
+            <a:avLst/>
+          </a:prstGeom>
+          <a:noFill/>
+          <a:ln>
+            <a:noFill/>
+          </a:ln>
+        </p:spPr>
+        <p:txBody>
+          <a:bodyPr anchorCtr="0" anchor="t" bIns="91425" lIns="91425" spcFirstLastPara="1" rIns="91425" wrap="square" tIns="91425">
+            <a:spAutoFit/>
+          </a:bodyPr>
+          <a:lstStyle/>
+          <a:p>
+            <a:pPr indent="0" lvl="0" marL="0" rtl="0" algn="l">
+              <a:spcBef>
+                <a:spcPts val="0"/>
+              </a:spcBef>
+              <a:spcAft>
+                <a:spcPts val="0"/>
+              </a:spcAft>
+              <a:buNone/>
+            </a:pPr>
+            <a:r>
+              <a:rPr lang="en">
+                <a:latin typeface="Lato"/>
+                <a:ea typeface="Lato"/>
+                <a:cs typeface="Lato"/>
+                <a:sym typeface="Lato"/>
+              </a:rPr>
+              <a:t>Difference is insignificant to draw an conclusion</a:t>
+            </a:r>
+            <a:endParaRPr>
+              <a:latin typeface="Lato"/>
+              <a:ea typeface="Lato"/>
+              <a:cs typeface="Lato"/>
+              <a:sym typeface="Lato"/>
+            </a:endParaRPr>
+          </a:p>
+        </p:txBody>
+      </p:sp>
     </p:spTree>
   </p:cSld>
   <p:clrMapOvr>
@@ -10627,7 +9874,7 @@
   <p:cSld>
     <p:spTree>
       <p:nvGrpSpPr>
-        <p:cNvPr id="133" name="Shape 133"/>
+        <p:cNvPr id="132" name="Shape 132"/>
         <p:cNvGrpSpPr/>
         <p:nvPr/>
       </p:nvGrpSpPr>
@@ -10641,7 +9888,7 @@
       </p:grpSpPr>
       <p:sp>
         <p:nvSpPr>
-          <p:cNvPr id="134" name="Google Shape;134;p19"/>
+          <p:cNvPr id="133" name="Google Shape;133;p19"/>
           <p:cNvSpPr txBox="1"/>
           <p:nvPr>
             <p:ph type="title"/>
@@ -10673,141 +9920,7 @@
             </a:pPr>
             <a:r>
               <a:rPr lang="en"/>
-              <a:t> Brief Abstract </a:t>
-            </a:r>
-            <a:endParaRPr/>
-          </a:p>
-        </p:txBody>
-      </p:sp>
-      <p:sp>
-        <p:nvSpPr>
-          <p:cNvPr id="135" name="Google Shape;135;p19"/>
-          <p:cNvSpPr txBox="1"/>
-          <p:nvPr>
-            <p:ph idx="1" type="body"/>
-          </p:nvPr>
-        </p:nvSpPr>
-        <p:spPr>
-          <a:xfrm>
-            <a:off x="729450" y="2078875"/>
-            <a:ext cx="3842700" cy="2261100"/>
-          </a:xfrm>
-          <a:prstGeom prst="rect">
-            <a:avLst/>
-          </a:prstGeom>
-        </p:spPr>
-        <p:txBody>
-          <a:bodyPr anchorCtr="0" anchor="t" bIns="91425" lIns="91425" spcFirstLastPara="1" rIns="91425" wrap="square" tIns="91425">
-            <a:normAutofit fontScale="25000" lnSpcReduction="20000"/>
-          </a:bodyPr>
-          <a:lstStyle/>
-          <a:p>
-            <a:pPr indent="0" lvl="0" marL="0" rtl="0" algn="l">
-              <a:spcBef>
-                <a:spcPts val="0"/>
-              </a:spcBef>
-              <a:spcAft>
-                <a:spcPts val="0"/>
-              </a:spcAft>
-              <a:buNone/>
-            </a:pPr>
-            <a:r>
-              <a:rPr lang="en" sz="5200">
-                <a:solidFill>
-                  <a:srgbClr val="24292F"/>
-                </a:solidFill>
-                <a:highlight>
-                  <a:srgbClr val="FFFFFF"/>
-                </a:highlight>
-              </a:rPr>
-              <a:t>Our goal was to find trends that will allow us to find PFAS/Teflon in GA. The reasons being that it can cause serious health issues if entering a person's blood system. Since the chemical never fully goes  away, it stays once anyone is exposed to it. So we want to be able indicate/reveal PFAS at any site to prevent harm and find the offenders causing it.</a:t>
-            </a:r>
-            <a:endParaRPr sz="5200">
-              <a:solidFill>
-                <a:srgbClr val="24292F"/>
-              </a:solidFill>
-              <a:highlight>
-                <a:srgbClr val="FFFFFF"/>
-              </a:highlight>
-            </a:endParaRPr>
-          </a:p>
-          <a:p>
-            <a:pPr indent="0" lvl="0" marL="0" rtl="0" algn="l">
-              <a:spcBef>
-                <a:spcPts val="1200"/>
-              </a:spcBef>
-              <a:spcAft>
-                <a:spcPts val="0"/>
-              </a:spcAft>
-              <a:buNone/>
-            </a:pPr>
-            <a:r>
-              <a:rPr lang="en" sz="5200">
-                <a:solidFill>
-                  <a:srgbClr val="24292F"/>
-                </a:solidFill>
-                <a:highlight>
-                  <a:srgbClr val="FFFFFF"/>
-                </a:highlight>
-              </a:rPr>
-              <a:t>Link to </a:t>
-            </a:r>
-            <a:r>
-              <a:rPr lang="en" sz="5200" u="sng">
-                <a:solidFill>
-                  <a:schemeClr val="hlink"/>
-                </a:solidFill>
-                <a:highlight>
-                  <a:srgbClr val="FFFFFF"/>
-                </a:highlight>
-                <a:hlinkClick r:id="rId3"/>
-              </a:rPr>
-              <a:t>Final Report</a:t>
-            </a:r>
-            <a:endParaRPr sz="5200">
-              <a:solidFill>
-                <a:srgbClr val="24292F"/>
-              </a:solidFill>
-              <a:highlight>
-                <a:srgbClr val="FFFFFF"/>
-              </a:highlight>
-            </a:endParaRPr>
-          </a:p>
-          <a:p>
-            <a:pPr indent="0" lvl="0" marL="0" rtl="0" algn="l">
-              <a:spcBef>
-                <a:spcPts val="1200"/>
-              </a:spcBef>
-              <a:spcAft>
-                <a:spcPts val="0"/>
-              </a:spcAft>
-              <a:buNone/>
-            </a:pPr>
-            <a:r>
-              <a:t/>
-            </a:r>
-            <a:endParaRPr sz="1100">
-              <a:solidFill>
-                <a:srgbClr val="000000"/>
-              </a:solidFill>
-              <a:latin typeface="Arial"/>
-              <a:ea typeface="Arial"/>
-              <a:cs typeface="Arial"/>
-              <a:sym typeface="Arial"/>
-            </a:endParaRPr>
-          </a:p>
-          <a:p>
-            <a:pPr indent="0" lvl="0" marL="0" rtl="0" algn="l">
-              <a:spcBef>
-                <a:spcPts val="0"/>
-              </a:spcBef>
-              <a:spcAft>
-                <a:spcPts val="1200"/>
-              </a:spcAft>
-              <a:buNone/>
-            </a:pPr>
-            <a:r>
-              <a:t/>
+              <a:t>Is there a relationship between facilities, violations, and populations in Georgia? </a:t>
             </a:r>
             <a:endParaRPr/>
           </a:p>
@@ -10815,7 +9928,35 @@
       </p:sp>
       <p:pic>
         <p:nvPicPr>
-          <p:cNvPr id="136" name="Google Shape;136;p19"/>
+          <p:cNvPr id="134" name="Google Shape;134;p19"/>
+          <p:cNvPicPr preferRelativeResize="0"/>
+          <p:nvPr/>
+        </p:nvPicPr>
+        <p:blipFill>
+          <a:blip r:embed="rId3">
+            <a:alphaModFix/>
+          </a:blip>
+          <a:stretch>
+            <a:fillRect/>
+          </a:stretch>
+        </p:blipFill>
+        <p:spPr>
+          <a:xfrm>
+            <a:off x="4891225" y="1930475"/>
+            <a:ext cx="3815375" cy="2806025"/>
+          </a:xfrm>
+          <a:prstGeom prst="rect">
+            <a:avLst/>
+          </a:prstGeom>
+          <a:noFill/>
+          <a:ln>
+            <a:noFill/>
+          </a:ln>
+        </p:spPr>
+      </p:pic>
+      <p:pic>
+        <p:nvPicPr>
+          <p:cNvPr id="135" name="Google Shape;135;p19"/>
           <p:cNvPicPr preferRelativeResize="0"/>
           <p:nvPr/>
         </p:nvPicPr>
@@ -10829,8 +9970,8 @@
         </p:blipFill>
         <p:spPr>
           <a:xfrm>
-            <a:off x="4818250" y="1600175"/>
-            <a:ext cx="4007827" cy="2984850"/>
+            <a:off x="467150" y="2155075"/>
+            <a:ext cx="4015724" cy="2354975"/>
           </a:xfrm>
           <a:prstGeom prst="rect">
             <a:avLst/>
@@ -10841,6 +9982,58 @@
           </a:ln>
         </p:spPr>
       </p:pic>
+      <p:sp>
+        <p:nvSpPr>
+          <p:cNvPr id="136" name="Google Shape;136;p19"/>
+          <p:cNvSpPr txBox="1"/>
+          <p:nvPr/>
+        </p:nvSpPr>
+        <p:spPr>
+          <a:xfrm>
+            <a:off x="2004275" y="3463350"/>
+            <a:ext cx="2788800" cy="1046700"/>
+          </a:xfrm>
+          <a:prstGeom prst="rect">
+            <a:avLst/>
+          </a:prstGeom>
+          <a:noFill/>
+          <a:ln>
+            <a:noFill/>
+          </a:ln>
+        </p:spPr>
+        <p:txBody>
+          <a:bodyPr anchorCtr="0" anchor="t" bIns="91425" lIns="91425" spcFirstLastPara="1" rIns="91425" wrap="square" tIns="91425">
+            <a:spAutoFit/>
+          </a:bodyPr>
+          <a:lstStyle/>
+          <a:p>
+            <a:pPr indent="0" lvl="0" marL="0" rtl="0" algn="l">
+              <a:spcBef>
+                <a:spcPts val="0"/>
+              </a:spcBef>
+              <a:spcAft>
+                <a:spcPts val="0"/>
+              </a:spcAft>
+              <a:buNone/>
+            </a:pPr>
+            <a:r>
+              <a:rPr lang="en">
+                <a:latin typeface="Lato"/>
+                <a:ea typeface="Lato"/>
+                <a:cs typeface="Lato"/>
+                <a:sym typeface="Lato"/>
+              </a:rPr>
+              <a:t>There is a relationships between facilities, violations, and populations in Georgia: Lower populations equals more facilities</a:t>
+            </a:r>
+            <a:endParaRPr>
+              <a:latin typeface="Lato"/>
+              <a:ea typeface="Lato"/>
+              <a:cs typeface="Lato"/>
+              <a:sym typeface="Lato"/>
+            </a:endParaRPr>
+          </a:p>
+        </p:txBody>
+      </p:sp>
     </p:spTree>
   </p:cSld>
   <p:clrMapOvr>
@@ -10900,51 +10093,7 @@
             </a:pPr>
             <a:r>
               <a:rPr lang="en"/>
-              <a:t>Updated Deep note</a:t>
-            </a:r>
-            <a:endParaRPr/>
-          </a:p>
-        </p:txBody>
-      </p:sp>
-      <p:sp>
-        <p:nvSpPr>
-          <p:cNvPr id="142" name="Google Shape;142;p20"/>
-          <p:cNvSpPr txBox="1"/>
-          <p:nvPr>
-            <p:ph idx="1" type="body"/>
-          </p:nvPr>
-        </p:nvSpPr>
-        <p:spPr>
-          <a:xfrm>
-            <a:off x="729450" y="2078875"/>
-            <a:ext cx="2967300" cy="2261100"/>
-          </a:xfrm>
-          <a:prstGeom prst="rect">
-            <a:avLst/>
-          </a:prstGeom>
-        </p:spPr>
-        <p:txBody>
-          <a:bodyPr anchorCtr="0" anchor="t" bIns="91425" lIns="91425" spcFirstLastPara="1" rIns="91425" wrap="square" tIns="91425">
-            <a:normAutofit/>
-          </a:bodyPr>
-          <a:lstStyle/>
-          <a:p>
-            <a:pPr indent="0" lvl="0" marL="0" rtl="0" algn="l">
-              <a:spcBef>
-                <a:spcPts val="0"/>
-              </a:spcBef>
-              <a:spcAft>
-                <a:spcPts val="1200"/>
-              </a:spcAft>
-              <a:buNone/>
-            </a:pPr>
-            <a:r>
-              <a:rPr lang="en"/>
-              <a:t>This is an updated version of our deep note, it shows more in depth version of our hypothesis. It has new </a:t>
-            </a:r>
-            <a:r>
-              <a:rPr lang="en"/>
-              <a:t>visualizations and our abstract in it.</a:t>
+              <a:t>Where did PFAS occur most in Georgia in 2016?</a:t>
             </a:r>
             <a:endParaRPr/>
           </a:p>
@@ -10952,7 +10101,7 @@
       </p:sp>
       <p:pic>
         <p:nvPicPr>
-          <p:cNvPr id="143" name="Google Shape;143;p20"/>
+          <p:cNvPr id="142" name="Google Shape;142;p20"/>
           <p:cNvPicPr preferRelativeResize="0"/>
           <p:nvPr/>
         </p:nvPicPr>
@@ -10966,8 +10115,8 @@
         </p:blipFill>
         <p:spPr>
           <a:xfrm>
-            <a:off x="3881300" y="1620500"/>
-            <a:ext cx="5142449" cy="2946024"/>
+            <a:off x="572625" y="2433422"/>
+            <a:ext cx="3693700" cy="1972275"/>
           </a:xfrm>
           <a:prstGeom prst="rect">
             <a:avLst/>
@@ -10978,6 +10127,109 @@
           </a:ln>
         </p:spPr>
       </p:pic>
+      <p:pic>
+        <p:nvPicPr>
+          <p:cNvPr id="143" name="Google Shape;143;p20"/>
+          <p:cNvPicPr preferRelativeResize="0"/>
+          <p:nvPr/>
+        </p:nvPicPr>
+        <p:blipFill>
+          <a:blip r:embed="rId4">
+            <a:alphaModFix/>
+          </a:blip>
+          <a:stretch>
+            <a:fillRect/>
+          </a:stretch>
+        </p:blipFill>
+        <p:spPr>
+          <a:xfrm>
+            <a:off x="4066951" y="2511500"/>
+            <a:ext cx="2344026" cy="2407500"/>
+          </a:xfrm>
+          <a:prstGeom prst="rect">
+            <a:avLst/>
+          </a:prstGeom>
+          <a:noFill/>
+          <a:ln>
+            <a:noFill/>
+          </a:ln>
+        </p:spPr>
+      </p:pic>
+      <p:pic>
+        <p:nvPicPr>
+          <p:cNvPr id="144" name="Google Shape;144;p20"/>
+          <p:cNvPicPr preferRelativeResize="0"/>
+          <p:nvPr/>
+        </p:nvPicPr>
+        <p:blipFill>
+          <a:blip r:embed="rId5">
+            <a:alphaModFix/>
+          </a:blip>
+          <a:stretch>
+            <a:fillRect/>
+          </a:stretch>
+        </p:blipFill>
+        <p:spPr>
+          <a:xfrm>
+            <a:off x="6317921" y="2078862"/>
+            <a:ext cx="2590600" cy="2797251"/>
+          </a:xfrm>
+          <a:prstGeom prst="rect">
+            <a:avLst/>
+          </a:prstGeom>
+          <a:noFill/>
+          <a:ln>
+            <a:noFill/>
+          </a:ln>
+        </p:spPr>
+      </p:pic>
+      <p:sp>
+        <p:nvSpPr>
+          <p:cNvPr id="145" name="Google Shape;145;p20"/>
+          <p:cNvSpPr/>
+          <p:nvPr/>
+        </p:nvSpPr>
+        <p:spPr>
+          <a:xfrm>
+            <a:off x="7301800" y="2144300"/>
+            <a:ext cx="154200" cy="1850100"/>
+          </a:xfrm>
+          <a:prstGeom prst="rect">
+            <a:avLst/>
+          </a:prstGeom>
+          <a:noFill/>
+          <a:ln cap="flat" cmpd="sng" w="9525">
+            <a:solidFill>
+              <a:srgbClr val="FF0000"/>
+            </a:solidFill>
+            <a:prstDash val="solid"/>
+            <a:round/>
+            <a:headEnd len="sm" w="sm" type="none"/>
+            <a:tailEnd len="sm" w="sm" type="none"/>
+          </a:ln>
+        </p:spPr>
+        <p:txBody>
+          <a:bodyPr anchorCtr="0" anchor="ctr" bIns="91425" lIns="91425" spcFirstLastPara="1" rIns="91425" wrap="square" tIns="91425">
+            <a:noAutofit/>
+          </a:bodyPr>
+          <a:lstStyle/>
+          <a:p>
+            <a:pPr indent="0" lvl="0" marL="0" rtl="0" algn="l">
+              <a:spcBef>
+                <a:spcPts val="0"/>
+              </a:spcBef>
+              <a:spcAft>
+                <a:spcPts val="0"/>
+              </a:spcAft>
+              <a:buNone/>
+            </a:pPr>
+            <a:r>
+              <a:t/>
+            </a:r>
+            <a:endParaRPr/>
+          </a:p>
+        </p:txBody>
+      </p:sp>
     </p:spTree>
   </p:cSld>
   <p:clrMapOvr>
@@ -10991,7 +10243,7 @@
   <p:cSld>
     <p:spTree>
       <p:nvGrpSpPr>
-        <p:cNvPr id="147" name="Shape 147"/>
+        <p:cNvPr id="149" name="Shape 149"/>
         <p:cNvGrpSpPr/>
         <p:nvPr/>
       </p:nvGrpSpPr>
@@ -11005,7 +10257,7 @@
       </p:grpSpPr>
       <p:sp>
         <p:nvSpPr>
-          <p:cNvPr id="148" name="Google Shape;148;p21"/>
+          <p:cNvPr id="150" name="Google Shape;150;p21"/>
           <p:cNvSpPr txBox="1"/>
           <p:nvPr>
             <p:ph type="title"/>
@@ -11045,7 +10297,7 @@
       </p:sp>
       <p:sp>
         <p:nvSpPr>
-          <p:cNvPr id="149" name="Google Shape;149;p21"/>
+          <p:cNvPr id="151" name="Google Shape;151;p21"/>
           <p:cNvSpPr txBox="1"/>
           <p:nvPr>
             <p:ph idx="1" type="body"/>
@@ -11066,105 +10318,105 @@
           </a:bodyPr>
           <a:lstStyle/>
           <a:p>
-            <a:pPr indent="-311150" lvl="0" marL="457200" rtl="0" algn="l">
-              <a:spcBef>
-                <a:spcPts val="0"/>
-              </a:spcBef>
-              <a:spcAft>
-                <a:spcPts val="0"/>
-              </a:spcAft>
-              <a:buSzPts val="1300"/>
+            <a:pPr indent="-323850" lvl="0" marL="457200" rtl="0" algn="l">
+              <a:spcBef>
+                <a:spcPts val="0"/>
+              </a:spcBef>
+              <a:spcAft>
+                <a:spcPts val="0"/>
+              </a:spcAft>
+              <a:buSzPts val="1500"/>
               <a:buChar char="●"/>
             </a:pPr>
             <a:r>
-              <a:rPr lang="en"/>
+              <a:rPr lang="en" sz="1500"/>
               <a:t>Only the first three hypothesis were implemented</a:t>
             </a:r>
-            <a:endParaRPr/>
+            <a:endParaRPr sz="1500"/>
           </a:p>
           <a:p>
-            <a:pPr indent="-311150" lvl="0" marL="457200" rtl="0" algn="l">
-              <a:spcBef>
-                <a:spcPts val="0"/>
-              </a:spcBef>
-              <a:spcAft>
-                <a:spcPts val="0"/>
-              </a:spcAft>
-              <a:buSzPts val="1300"/>
+            <a:pPr indent="-323850" lvl="0" marL="457200" rtl="0" algn="l">
+              <a:spcBef>
+                <a:spcPts val="0"/>
+              </a:spcBef>
+              <a:spcAft>
+                <a:spcPts val="0"/>
+              </a:spcAft>
+              <a:buSzPts val="1500"/>
               <a:buChar char="●"/>
             </a:pPr>
             <a:r>
-              <a:rPr lang="en"/>
+              <a:rPr lang="en" sz="1500"/>
               <a:t>Website with interactive map and information about PFAS that we learned</a:t>
             </a:r>
-            <a:endParaRPr/>
+            <a:endParaRPr sz="1500"/>
           </a:p>
           <a:p>
-            <a:pPr indent="-311150" lvl="0" marL="457200" rtl="0" algn="l">
-              <a:spcBef>
-                <a:spcPts val="0"/>
-              </a:spcBef>
-              <a:spcAft>
-                <a:spcPts val="0"/>
-              </a:spcAft>
-              <a:buSzPts val="1300"/>
+            <a:pPr indent="-323850" lvl="0" marL="457200" rtl="0" algn="l">
+              <a:spcBef>
+                <a:spcPts val="0"/>
+              </a:spcBef>
+              <a:spcAft>
+                <a:spcPts val="0"/>
+              </a:spcAft>
+              <a:buSzPts val="1500"/>
               <a:buChar char="●"/>
             </a:pPr>
             <a:r>
-              <a:rPr lang="en"/>
+              <a:rPr lang="en" sz="1500"/>
               <a:t>We </a:t>
             </a:r>
             <a:r>
-              <a:rPr lang="en"/>
+              <a:rPr lang="en" sz="1500"/>
               <a:t>implemented</a:t>
             </a:r>
             <a:r>
-              <a:rPr lang="en"/>
+              <a:rPr lang="en" sz="1500"/>
               <a:t> two </a:t>
             </a:r>
             <a:r>
-              <a:rPr lang="en"/>
+              <a:rPr lang="en" sz="1500"/>
               <a:t>algorithms</a:t>
             </a:r>
             <a:r>
-              <a:rPr lang="en"/>
+              <a:rPr lang="en" sz="1500"/>
               <a:t> being clustering and linear regression</a:t>
             </a:r>
-            <a:endParaRPr/>
+            <a:endParaRPr sz="1500"/>
           </a:p>
           <a:p>
-            <a:pPr indent="-311150" lvl="0" marL="457200" rtl="0" algn="l">
-              <a:spcBef>
-                <a:spcPts val="0"/>
-              </a:spcBef>
-              <a:spcAft>
-                <a:spcPts val="0"/>
-              </a:spcAft>
-              <a:buSzPts val="1300"/>
+            <a:pPr indent="-323850" lvl="0" marL="457200" rtl="0" algn="l">
+              <a:spcBef>
+                <a:spcPts val="0"/>
+              </a:spcBef>
+              <a:spcAft>
+                <a:spcPts val="0"/>
+              </a:spcAft>
+              <a:buSzPts val="1500"/>
               <a:buChar char="●"/>
             </a:pPr>
             <a:r>
-              <a:rPr lang="en"/>
+              <a:rPr lang="en" sz="1500"/>
               <a:t>Visualizations to support the hypothesis was done</a:t>
             </a:r>
-            <a:endParaRPr/>
+            <a:endParaRPr sz="1500"/>
           </a:p>
           <a:p>
-            <a:pPr indent="-311150" lvl="0" marL="457200" rtl="0" algn="l">
-              <a:spcBef>
-                <a:spcPts val="0"/>
-              </a:spcBef>
-              <a:spcAft>
-                <a:spcPts val="0"/>
-              </a:spcAft>
-              <a:buSzPts val="1300"/>
+            <a:pPr indent="-323850" lvl="0" marL="457200" rtl="0" algn="l">
+              <a:spcBef>
+                <a:spcPts val="0"/>
+              </a:spcBef>
+              <a:spcAft>
+                <a:spcPts val="0"/>
+              </a:spcAft>
+              <a:buSzPts val="1500"/>
               <a:buChar char="●"/>
             </a:pPr>
             <a:r>
-              <a:rPr lang="en"/>
+              <a:rPr lang="en" sz="1500"/>
               <a:t>Research on sites with PFAS and the cause at the time it happened</a:t>
             </a:r>
-            <a:endParaRPr/>
+            <a:endParaRPr sz="1500"/>
           </a:p>
           <a:p>
             <a:pPr indent="0" lvl="0" marL="0" rtl="0" algn="l">
@@ -11192,6 +10444,285 @@
 </file>
 
 <file path=ppt/theme/theme1.xml><?xml version="1.0" encoding="utf-8"?>
+<a:theme xmlns:a="http://schemas.openxmlformats.org/drawingml/2006/main" xmlns:r="http://schemas.openxmlformats.org/officeDocument/2006/relationships" name="Streamline">
+  <a:themeElements>
+    <a:clrScheme name="Streamline">
+      <a:dk1>
+        <a:srgbClr val="1A9988"/>
+      </a:dk1>
+      <a:lt1>
+        <a:srgbClr val="FFFFFF"/>
+      </a:lt1>
+      <a:dk2>
+        <a:srgbClr val="1A1A1A"/>
+      </a:dk2>
+      <a:lt2>
+        <a:srgbClr val="E9EDEE"/>
+      </a:lt2>
+      <a:accent1>
+        <a:srgbClr val="595959"/>
+      </a:accent1>
+      <a:accent2>
+        <a:srgbClr val="6AA4C8"/>
+      </a:accent2>
+      <a:accent3>
+        <a:srgbClr val="EB5600"/>
+      </a:accent3>
+      <a:accent4>
+        <a:srgbClr val="A2FFE8"/>
+      </a:accent4>
+      <a:accent5>
+        <a:srgbClr val="1C3678"/>
+      </a:accent5>
+      <a:accent6>
+        <a:srgbClr val="FFB8A2"/>
+      </a:accent6>
+      <a:hlink>
+        <a:srgbClr val="1C3678"/>
+      </a:hlink>
+      <a:folHlink>
+        <a:srgbClr val="1C3678"/>
+      </a:folHlink>
+    </a:clrScheme>
+    <a:fontScheme name="Office">
+      <a:majorFont>
+        <a:latin typeface="Arial"/>
+        <a:ea typeface=""/>
+        <a:cs typeface=""/>
+        <a:font script="Jpan" typeface="ＭＳ Ｐゴシック"/>
+        <a:font script="Hang" typeface="맑은 고딕"/>
+        <a:font script="Hans" typeface="宋体"/>
+        <a:font script="Hant" typeface="新細明體"/>
+        <a:font script="Arab" typeface="Times New Roman"/>
+        <a:font script="Hebr" typeface="Times New Roman"/>
+        <a:font script="Thai" typeface="Angsana New"/>
+        <a:font script="Ethi" typeface="Nyala"/>
+        <a:font script="Beng" typeface="Vrinda"/>
+        <a:font script="Gujr" typeface="Shruti"/>
+        <a:font script="Khmr" typeface="MoolBoran"/>
+        <a:font script="Knda" typeface="Tunga"/>
+        <a:font script="Guru" typeface="Raavi"/>
+        <a:font script="Cans" typeface="Euphemia"/>
+        <a:font script="Cher" typeface="Plantagenet Cherokee"/>
+        <a:font script="Yiii" typeface="Microsoft Yi Baiti"/>
+        <a:font script="Tibt" typeface="Microsoft Himalaya"/>
+        <a:font script="Thaa" typeface="MV Boli"/>
+        <a:font script="Deva" typeface="Mangal"/>
+        <a:font script="Telu" typeface="Gautami"/>
+        <a:font script="Taml" typeface="Latha"/>
+        <a:font script="Syrc" typeface="Estrangelo Edessa"/>
+        <a:font script="Orya" typeface="Kalinga"/>
+        <a:font script="Mlym" typeface="Kartika"/>
+        <a:font script="Laoo" typeface="DokChampa"/>
+        <a:font script="Sinh" typeface="Iskoola Pota"/>
+        <a:font script="Mong" typeface="Mongolian Baiti"/>
+        <a:font script="Viet" typeface="Times New Roman"/>
+        <a:font script="Uigh" typeface="Microsoft Uighur"/>
+        <a:font script="Geor" typeface="Sylfaen"/>
+      </a:majorFont>
+      <a:minorFont>
+        <a:latin typeface="Arial"/>
+        <a:ea typeface=""/>
+        <a:cs typeface=""/>
+        <a:font script="Jpan" typeface="ＭＳ Ｐゴシック"/>
+        <a:font script="Hang" typeface="맑은 고딕"/>
+        <a:font script="Hans" typeface="宋体"/>
+        <a:font script="Hant" typeface="新細明體"/>
+        <a:font script="Arab" typeface="Arial"/>
+        <a:font script="Hebr" typeface="Arial"/>
+        <a:font script="Thai" typeface="Cordia New"/>
+        <a:font script="Ethi" typeface="Nyala"/>
+        <a:font script="Beng" typeface="Vrinda"/>
+        <a:font script="Gujr" typeface="Shruti"/>
+        <a:font script="Khmr" typeface="DaunPenh"/>
+        <a:font script="Knda" typeface="Tunga"/>
+        <a:font script="Guru" typeface="Raavi"/>
+        <a:font script="Cans" typeface="Euphemia"/>
+        <a:font script="Cher" typeface="Plantagenet Cherokee"/>
+        <a:font script="Yiii" typeface="Microsoft Yi Baiti"/>
+        <a:font script="Tibt" typeface="Microsoft Himalaya"/>
+        <a:font script="Thaa" typeface="MV Boli"/>
+        <a:font script="Deva" typeface="Mangal"/>
+        <a:font script="Telu" typeface="Gautami"/>
+        <a:font script="Taml" typeface="Latha"/>
+        <a:font script="Syrc" typeface="Estrangelo Edessa"/>
+        <a:font script="Orya" typeface="Kalinga"/>
+        <a:font script="Mlym" typeface="Kartika"/>
+        <a:font script="Laoo" typeface="DokChampa"/>
+        <a:font script="Sinh" typeface="Iskoola Pota"/>
+        <a:font script="Mong" typeface="Mongolian Baiti"/>
+        <a:font script="Viet" typeface="Arial"/>
+        <a:font script="Uigh" typeface="Microsoft Uighur"/>
+        <a:font script="Geor" typeface="Sylfaen"/>
+      </a:minorFont>
+    </a:fontScheme>
+    <a:fmtScheme name="Office">
+      <a:fillStyleLst>
+        <a:solidFill>
+          <a:schemeClr val="phClr"/>
+        </a:solidFill>
+        <a:gradFill rotWithShape="1">
+          <a:gsLst>
+            <a:gs pos="0">
+              <a:schemeClr val="phClr">
+                <a:tint val="50000"/>
+                <a:satMod val="300000"/>
+              </a:schemeClr>
+            </a:gs>
+            <a:gs pos="35000">
+              <a:schemeClr val="phClr">
+                <a:tint val="37000"/>
+                <a:satMod val="300000"/>
+              </a:schemeClr>
+            </a:gs>
+            <a:gs pos="100000">
+              <a:schemeClr val="phClr">
+                <a:tint val="15000"/>
+                <a:satMod val="350000"/>
+              </a:schemeClr>
+            </a:gs>
+          </a:gsLst>
+          <a:lin ang="16200000" scaled="1"/>
+        </a:gradFill>
+        <a:gradFill rotWithShape="1">
+          <a:gsLst>
+            <a:gs pos="0">
+              <a:schemeClr val="phClr">
+                <a:tint val="100000"/>
+                <a:shade val="100000"/>
+                <a:satMod val="130000"/>
+              </a:schemeClr>
+            </a:gs>
+            <a:gs pos="100000">
+              <a:schemeClr val="phClr">
+                <a:tint val="50000"/>
+                <a:shade val="100000"/>
+                <a:satMod val="350000"/>
+              </a:schemeClr>
+            </a:gs>
+          </a:gsLst>
+          <a:lin ang="16200000" scaled="0"/>
+        </a:gradFill>
+      </a:fillStyleLst>
+      <a:lnStyleLst>
+        <a:ln w="9525" cap="flat" cmpd="sng" algn="ctr">
+          <a:solidFill>
+            <a:schemeClr val="phClr">
+              <a:shade val="95000"/>
+              <a:satMod val="105000"/>
+            </a:schemeClr>
+          </a:solidFill>
+          <a:prstDash val="solid"/>
+        </a:ln>
+        <a:ln w="25400" cap="flat" cmpd="sng" algn="ctr">
+          <a:solidFill>
+            <a:schemeClr val="phClr"/>
+          </a:solidFill>
+          <a:prstDash val="solid"/>
+        </a:ln>
+        <a:ln w="38100" cap="flat" cmpd="sng" algn="ctr">
+          <a:solidFill>
+            <a:schemeClr val="phClr"/>
+          </a:solidFill>
+          <a:prstDash val="solid"/>
+        </a:ln>
+      </a:lnStyleLst>
+      <a:effectStyleLst>
+        <a:effectStyle>
+          <a:effectLst>
+            <a:outerShdw blurRad="40000" dist="20000" dir="5400000" rotWithShape="0">
+              <a:srgbClr val="000000">
+                <a:alpha val="38000"/>
+              </a:srgbClr>
+            </a:outerShdw>
+          </a:effectLst>
+        </a:effectStyle>
+        <a:effectStyle>
+          <a:effectLst>
+            <a:outerShdw blurRad="40000" dist="23000" dir="5400000" rotWithShape="0">
+              <a:srgbClr val="000000">
+                <a:alpha val="35000"/>
+              </a:srgbClr>
+            </a:outerShdw>
+          </a:effectLst>
+        </a:effectStyle>
+        <a:effectStyle>
+          <a:effectLst>
+            <a:outerShdw blurRad="40000" dist="23000" dir="5400000" rotWithShape="0">
+              <a:srgbClr val="000000">
+                <a:alpha val="35000"/>
+              </a:srgbClr>
+            </a:outerShdw>
+          </a:effectLst>
+          <a:scene3d>
+            <a:camera prst="orthographicFront">
+              <a:rot lat="0" lon="0" rev="0"/>
+            </a:camera>
+            <a:lightRig rig="threePt" dir="t">
+              <a:rot lat="0" lon="0" rev="1200000"/>
+            </a:lightRig>
+          </a:scene3d>
+          <a:sp3d>
+            <a:bevelT w="63500" h="25400"/>
+          </a:sp3d>
+        </a:effectStyle>
+      </a:effectStyleLst>
+      <a:bgFillStyleLst>
+        <a:solidFill>
+          <a:schemeClr val="phClr"/>
+        </a:solidFill>
+        <a:gradFill rotWithShape="1">
+          <a:gsLst>
+            <a:gs pos="0">
+              <a:schemeClr val="phClr">
+                <a:tint val="40000"/>
+                <a:satMod val="350000"/>
+              </a:schemeClr>
+            </a:gs>
+            <a:gs pos="40000">
+              <a:schemeClr val="phClr">
+                <a:tint val="45000"/>
+                <a:shade val="99000"/>
+                <a:satMod val="350000"/>
+              </a:schemeClr>
+            </a:gs>
+            <a:gs pos="100000">
+              <a:schemeClr val="phClr">
+                <a:shade val="20000"/>
+                <a:satMod val="255000"/>
+              </a:schemeClr>
+            </a:gs>
+          </a:gsLst>
+          <a:path path="circle">
+            <a:fillToRect l="50000" t="-80000" r="50000" b="180000"/>
+          </a:path>
+        </a:gradFill>
+        <a:gradFill rotWithShape="1">
+          <a:gsLst>
+            <a:gs pos="0">
+              <a:schemeClr val="phClr">
+                <a:tint val="80000"/>
+                <a:satMod val="300000"/>
+              </a:schemeClr>
+            </a:gs>
+            <a:gs pos="100000">
+              <a:schemeClr val="phClr">
+                <a:shade val="30000"/>
+                <a:satMod val="200000"/>
+              </a:schemeClr>
+            </a:gs>
+          </a:gsLst>
+          <a:path path="circle">
+            <a:fillToRect l="50000" t="50000" r="50000" b="50000"/>
+          </a:path>
+        </a:gradFill>
+      </a:bgFillStyleLst>
+    </a:fmtScheme>
+  </a:themeElements>
+</a:theme>
+</file>
+
+<file path=ppt/theme/theme2.xml><?xml version="1.0" encoding="utf-8"?>
 <a:theme xmlns:a="http://schemas.openxmlformats.org/drawingml/2006/main" xmlns:r="http://schemas.openxmlformats.org/officeDocument/2006/relationships">
   <a:themeElements>
     <a:clrScheme name="Default">
@@ -11468,283 +10999,4 @@
     </a:fmtScheme>
   </a:themeElements>
 </a:theme>
-</file>
-
-<file path=ppt/theme/theme2.xml><?xml version="1.0" encoding="utf-8"?>
-<a:theme xmlns:a="http://schemas.openxmlformats.org/drawingml/2006/main" xmlns:r="http://schemas.openxmlformats.org/officeDocument/2006/relationships" name="Streamline">
-  <a:themeElements>
-    <a:clrScheme name="Streamline">
-      <a:dk1>
-        <a:srgbClr val="1A9988"/>
-      </a:dk1>
-      <a:lt1>
-        <a:srgbClr val="FFFFFF"/>
-      </a:lt1>
-      <a:dk2>
-        <a:srgbClr val="1A1A1A"/>
-      </a:dk2>
-      <a:lt2>
-        <a:srgbClr val="E9EDEE"/>
-      </a:lt2>
-      <a:accent1>
-        <a:srgbClr val="595959"/>
-      </a:accent1>
-      <a:accent2>
-        <a:srgbClr val="6AA4C8"/>
-      </a:accent2>
-      <a:accent3>
-        <a:srgbClr val="EB5600"/>
-      </a:accent3>
-      <a:accent4>
-        <a:srgbClr val="A2FFE8"/>
-      </a:accent4>
-      <a:accent5>
-        <a:srgbClr val="1C3678"/>
-      </a:accent5>
-      <a:accent6>
-        <a:srgbClr val="FFB8A2"/>
-      </a:accent6>
-      <a:hlink>
-        <a:srgbClr val="1C3678"/>
-      </a:hlink>
-      <a:folHlink>
-        <a:srgbClr val="1C3678"/>
-      </a:folHlink>
-    </a:clrScheme>
-    <a:fontScheme name="Office">
-      <a:majorFont>
-        <a:latin typeface="Arial"/>
-        <a:ea typeface=""/>
-        <a:cs typeface=""/>
-        <a:font script="Jpan" typeface="ＭＳ Ｐゴシック"/>
-        <a:font script="Hang" typeface="맑은 고딕"/>
-        <a:font script="Hans" typeface="宋体"/>
-        <a:font script="Hant" typeface="新細明體"/>
-        <a:font script="Arab" typeface="Times New Roman"/>
-        <a:font script="Hebr" typeface="Times New Roman"/>
-        <a:font script="Thai" typeface="Angsana New"/>
-        <a:font script="Ethi" typeface="Nyala"/>
-        <a:font script="Beng" typeface="Vrinda"/>
-        <a:font script="Gujr" typeface="Shruti"/>
-        <a:font script="Khmr" typeface="MoolBoran"/>
-        <a:font script="Knda" typeface="Tunga"/>
-        <a:font script="Guru" typeface="Raavi"/>
-        <a:font script="Cans" typeface="Euphemia"/>
-        <a:font script="Cher" typeface="Plantagenet Cherokee"/>
-        <a:font script="Yiii" typeface="Microsoft Yi Baiti"/>
-        <a:font script="Tibt" typeface="Microsoft Himalaya"/>
-        <a:font script="Thaa" typeface="MV Boli"/>
-        <a:font script="Deva" typeface="Mangal"/>
-        <a:font script="Telu" typeface="Gautami"/>
-        <a:font script="Taml" typeface="Latha"/>
-        <a:font script="Syrc" typeface="Estrangelo Edessa"/>
-        <a:font script="Orya" typeface="Kalinga"/>
-        <a:font script="Mlym" typeface="Kartika"/>
-        <a:font script="Laoo" typeface="DokChampa"/>
-        <a:font script="Sinh" typeface="Iskoola Pota"/>
-        <a:font script="Mong" typeface="Mongolian Baiti"/>
-        <a:font script="Viet" typeface="Times New Roman"/>
-        <a:font script="Uigh" typeface="Microsoft Uighur"/>
-        <a:font script="Geor" typeface="Sylfaen"/>
-      </a:majorFont>
-      <a:minorFont>
-        <a:latin typeface="Arial"/>
-        <a:ea typeface=""/>
-        <a:cs typeface=""/>
-        <a:font script="Jpan" typeface="ＭＳ Ｐゴシック"/>
-        <a:font script="Hang" typeface="맑은 고딕"/>
-        <a:font script="Hans" typeface="宋体"/>
-        <a:font script="Hant" typeface="新細明體"/>
-        <a:font script="Arab" typeface="Arial"/>
-        <a:font script="Hebr" typeface="Arial"/>
-        <a:font script="Thai" typeface="Cordia New"/>
-        <a:font script="Ethi" typeface="Nyala"/>
-        <a:font script="Beng" typeface="Vrinda"/>
-        <a:font script="Gujr" typeface="Shruti"/>
-        <a:font script="Khmr" typeface="DaunPenh"/>
-        <a:font script="Knda" typeface="Tunga"/>
-        <a:font script="Guru" typeface="Raavi"/>
-        <a:font script="Cans" typeface="Euphemia"/>
-        <a:font script="Cher" typeface="Plantagenet Cherokee"/>
-        <a:font script="Yiii" typeface="Microsoft Yi Baiti"/>
-        <a:font script="Tibt" typeface="Microsoft Himalaya"/>
-        <a:font script="Thaa" typeface="MV Boli"/>
-        <a:font script="Deva" typeface="Mangal"/>
-        <a:font script="Telu" typeface="Gautami"/>
-        <a:font script="Taml" typeface="Latha"/>
-        <a:font script="Syrc" typeface="Estrangelo Edessa"/>
-        <a:font script="Orya" typeface="Kalinga"/>
-        <a:font script="Mlym" typeface="Kartika"/>
-        <a:font script="Laoo" typeface="DokChampa"/>
-        <a:font script="Sinh" typeface="Iskoola Pota"/>
-        <a:font script="Mong" typeface="Mongolian Baiti"/>
-        <a:font script="Viet" typeface="Arial"/>
-        <a:font script="Uigh" typeface="Microsoft Uighur"/>
-        <a:font script="Geor" typeface="Sylfaen"/>
-      </a:minorFont>
-    </a:fontScheme>
-    <a:fmtScheme name="Office">
-      <a:fillStyleLst>
-        <a:solidFill>
-          <a:schemeClr val="phClr"/>
-        </a:solidFill>
-        <a:gradFill rotWithShape="1">
-          <a:gsLst>
-            <a:gs pos="0">
-              <a:schemeClr val="phClr">
-                <a:tint val="50000"/>
-                <a:satMod val="300000"/>
-              </a:schemeClr>
-            </a:gs>
-            <a:gs pos="35000">
-              <a:schemeClr val="phClr">
-                <a:tint val="37000"/>
-                <a:satMod val="300000"/>
-              </a:schemeClr>
-            </a:gs>
-            <a:gs pos="100000">
-              <a:schemeClr val="phClr">
-                <a:tint val="15000"/>
-                <a:satMod val="350000"/>
-              </a:schemeClr>
-            </a:gs>
-          </a:gsLst>
-          <a:lin ang="16200000" scaled="1"/>
-        </a:gradFill>
-        <a:gradFill rotWithShape="1">
-          <a:gsLst>
-            <a:gs pos="0">
-              <a:schemeClr val="phClr">
-                <a:tint val="100000"/>
-                <a:shade val="100000"/>
-                <a:satMod val="130000"/>
-              </a:schemeClr>
-            </a:gs>
-            <a:gs pos="100000">
-              <a:schemeClr val="phClr">
-                <a:tint val="50000"/>
-                <a:shade val="100000"/>
-                <a:satMod val="350000"/>
-              </a:schemeClr>
-            </a:gs>
-          </a:gsLst>
-          <a:lin ang="16200000" scaled="0"/>
-        </a:gradFill>
-      </a:fillStyleLst>
-      <a:lnStyleLst>
-        <a:ln w="9525" cap="flat" cmpd="sng" algn="ctr">
-          <a:solidFill>
-            <a:schemeClr val="phClr">
-              <a:shade val="95000"/>
-              <a:satMod val="105000"/>
-            </a:schemeClr>
-          </a:solidFill>
-          <a:prstDash val="solid"/>
-        </a:ln>
-        <a:ln w="25400" cap="flat" cmpd="sng" algn="ctr">
-          <a:solidFill>
-            <a:schemeClr val="phClr"/>
-          </a:solidFill>
-          <a:prstDash val="solid"/>
-        </a:ln>
-        <a:ln w="38100" cap="flat" cmpd="sng" algn="ctr">
-          <a:solidFill>
-            <a:schemeClr val="phClr"/>
-          </a:solidFill>
-          <a:prstDash val="solid"/>
-        </a:ln>
-      </a:lnStyleLst>
-      <a:effectStyleLst>
-        <a:effectStyle>
-          <a:effectLst>
-            <a:outerShdw blurRad="40000" dist="20000" dir="5400000" rotWithShape="0">
-              <a:srgbClr val="000000">
-                <a:alpha val="38000"/>
-              </a:srgbClr>
-            </a:outerShdw>
-          </a:effectLst>
-        </a:effectStyle>
-        <a:effectStyle>
-          <a:effectLst>
-            <a:outerShdw blurRad="40000" dist="23000" dir="5400000" rotWithShape="0">
-              <a:srgbClr val="000000">
-                <a:alpha val="35000"/>
-              </a:srgbClr>
-            </a:outerShdw>
-          </a:effectLst>
-        </a:effectStyle>
-        <a:effectStyle>
-          <a:effectLst>
-            <a:outerShdw blurRad="40000" dist="23000" dir="5400000" rotWithShape="0">
-              <a:srgbClr val="000000">
-                <a:alpha val="35000"/>
-              </a:srgbClr>
-            </a:outerShdw>
-          </a:effectLst>
-          <a:scene3d>
-            <a:camera prst="orthographicFront">
-              <a:rot lat="0" lon="0" rev="0"/>
-            </a:camera>
-            <a:lightRig rig="threePt" dir="t">
-              <a:rot lat="0" lon="0" rev="1200000"/>
-            </a:lightRig>
-          </a:scene3d>
-          <a:sp3d>
-            <a:bevelT w="63500" h="25400"/>
-          </a:sp3d>
-        </a:effectStyle>
-      </a:effectStyleLst>
-      <a:bgFillStyleLst>
-        <a:solidFill>
-          <a:schemeClr val="phClr"/>
-        </a:solidFill>
-        <a:gradFill rotWithShape="1">
-          <a:gsLst>
-            <a:gs pos="0">
-              <a:schemeClr val="phClr">
-                <a:tint val="40000"/>
-                <a:satMod val="350000"/>
-              </a:schemeClr>
-            </a:gs>
-            <a:gs pos="40000">
-              <a:schemeClr val="phClr">
-                <a:tint val="45000"/>
-                <a:shade val="99000"/>
-                <a:satMod val="350000"/>
-              </a:schemeClr>
-            </a:gs>
-            <a:gs pos="100000">
-              <a:schemeClr val="phClr">
-                <a:shade val="20000"/>
-                <a:satMod val="255000"/>
-              </a:schemeClr>
-            </a:gs>
-          </a:gsLst>
-          <a:path path="circle">
-            <a:fillToRect l="50000" t="-80000" r="50000" b="180000"/>
-          </a:path>
-        </a:gradFill>
-        <a:gradFill rotWithShape="1">
-          <a:gsLst>
-            <a:gs pos="0">
-              <a:schemeClr val="phClr">
-                <a:tint val="80000"/>
-                <a:satMod val="300000"/>
-              </a:schemeClr>
-            </a:gs>
-            <a:gs pos="100000">
-              <a:schemeClr val="phClr">
-                <a:shade val="30000"/>
-                <a:satMod val="200000"/>
-              </a:schemeClr>
-            </a:gs>
-          </a:gsLst>
-          <a:path path="circle">
-            <a:fillToRect l="50000" t="50000" r="50000" b="50000"/>
-          </a:path>
-        </a:gradFill>
-      </a:bgFillStyleLst>
-    </a:fmtScheme>
-  </a:themeElements>
-</a:theme>
 </file>
</xml_diff>